<commit_message>
Added slide to PowerPoint
</commit_message>
<xml_diff>
--- a/Documentation/PowerPoint/Robin-ER_Diagram+Contribution.pptx
+++ b/Documentation/PowerPoint/Robin-ER_Diagram+Contribution.pptx
@@ -5,12 +5,14 @@
     <p:sldMasterId id="2147483648" r:id="rId1"/>
   </p:sldMasterIdLst>
   <p:notesMasterIdLst>
-    <p:notesMasterId r:id="rId5"/>
+    <p:notesMasterId r:id="rId7"/>
   </p:notesMasterIdLst>
   <p:sldIdLst>
     <p:sldId id="256" r:id="rId2"/>
     <p:sldId id="257" r:id="rId3"/>
     <p:sldId id="258" r:id="rId4"/>
+    <p:sldId id="259" r:id="rId5"/>
+    <p:sldId id="260" r:id="rId6"/>
   </p:sldIdLst>
   <p:sldSz cx="12192000" cy="6858000"/>
   <p:notesSz cx="6858000" cy="9144000"/>
@@ -18,94 +20,124 @@
     <a:defPPr>
       <a:defRPr lang="en-US"/>
     </a:defPPr>
-    <a:lvl1pPr marL="0" algn="l" defTabSz="914400" rtl="0" eaLnBrk="1" latinLnBrk="0" hangingPunct="1">
-      <a:defRPr sz="1800" kern="1200">
+    <a:lvl1pPr algn="l" rtl="0" fontAlgn="base">
+      <a:spcBef>
+        <a:spcPct val="0"/>
+      </a:spcBef>
+      <a:spcAft>
+        <a:spcPct val="0"/>
+      </a:spcAft>
+      <a:defRPr kern="1200">
         <a:solidFill>
           <a:schemeClr val="tx1"/>
         </a:solidFill>
-        <a:latin typeface="+mn-lt"/>
+        <a:latin typeface="Arial" charset="0"/>
         <a:ea typeface="+mn-ea"/>
-        <a:cs typeface="+mn-cs"/>
+        <a:cs typeface="Arial" charset="0"/>
       </a:defRPr>
     </a:lvl1pPr>
-    <a:lvl2pPr marL="457200" algn="l" defTabSz="914400" rtl="0" eaLnBrk="1" latinLnBrk="0" hangingPunct="1">
-      <a:defRPr sz="1800" kern="1200">
+    <a:lvl2pPr marL="457200" algn="l" rtl="0" fontAlgn="base">
+      <a:spcBef>
+        <a:spcPct val="0"/>
+      </a:spcBef>
+      <a:spcAft>
+        <a:spcPct val="0"/>
+      </a:spcAft>
+      <a:defRPr kern="1200">
         <a:solidFill>
           <a:schemeClr val="tx1"/>
         </a:solidFill>
-        <a:latin typeface="+mn-lt"/>
+        <a:latin typeface="Arial" charset="0"/>
         <a:ea typeface="+mn-ea"/>
-        <a:cs typeface="+mn-cs"/>
+        <a:cs typeface="Arial" charset="0"/>
       </a:defRPr>
     </a:lvl2pPr>
-    <a:lvl3pPr marL="914400" algn="l" defTabSz="914400" rtl="0" eaLnBrk="1" latinLnBrk="0" hangingPunct="1">
-      <a:defRPr sz="1800" kern="1200">
+    <a:lvl3pPr marL="914400" algn="l" rtl="0" fontAlgn="base">
+      <a:spcBef>
+        <a:spcPct val="0"/>
+      </a:spcBef>
+      <a:spcAft>
+        <a:spcPct val="0"/>
+      </a:spcAft>
+      <a:defRPr kern="1200">
         <a:solidFill>
           <a:schemeClr val="tx1"/>
         </a:solidFill>
-        <a:latin typeface="+mn-lt"/>
+        <a:latin typeface="Arial" charset="0"/>
         <a:ea typeface="+mn-ea"/>
-        <a:cs typeface="+mn-cs"/>
+        <a:cs typeface="Arial" charset="0"/>
       </a:defRPr>
     </a:lvl3pPr>
-    <a:lvl4pPr marL="1371600" algn="l" defTabSz="914400" rtl="0" eaLnBrk="1" latinLnBrk="0" hangingPunct="1">
-      <a:defRPr sz="1800" kern="1200">
+    <a:lvl4pPr marL="1371600" algn="l" rtl="0" fontAlgn="base">
+      <a:spcBef>
+        <a:spcPct val="0"/>
+      </a:spcBef>
+      <a:spcAft>
+        <a:spcPct val="0"/>
+      </a:spcAft>
+      <a:defRPr kern="1200">
         <a:solidFill>
           <a:schemeClr val="tx1"/>
         </a:solidFill>
-        <a:latin typeface="+mn-lt"/>
+        <a:latin typeface="Arial" charset="0"/>
         <a:ea typeface="+mn-ea"/>
-        <a:cs typeface="+mn-cs"/>
+        <a:cs typeface="Arial" charset="0"/>
       </a:defRPr>
     </a:lvl4pPr>
-    <a:lvl5pPr marL="1828800" algn="l" defTabSz="914400" rtl="0" eaLnBrk="1" latinLnBrk="0" hangingPunct="1">
-      <a:defRPr sz="1800" kern="1200">
+    <a:lvl5pPr marL="1828800" algn="l" rtl="0" fontAlgn="base">
+      <a:spcBef>
+        <a:spcPct val="0"/>
+      </a:spcBef>
+      <a:spcAft>
+        <a:spcPct val="0"/>
+      </a:spcAft>
+      <a:defRPr kern="1200">
         <a:solidFill>
           <a:schemeClr val="tx1"/>
         </a:solidFill>
-        <a:latin typeface="+mn-lt"/>
+        <a:latin typeface="Arial" charset="0"/>
         <a:ea typeface="+mn-ea"/>
-        <a:cs typeface="+mn-cs"/>
+        <a:cs typeface="Arial" charset="0"/>
       </a:defRPr>
     </a:lvl5pPr>
     <a:lvl6pPr marL="2286000" algn="l" defTabSz="914400" rtl="0" eaLnBrk="1" latinLnBrk="0" hangingPunct="1">
-      <a:defRPr sz="1800" kern="1200">
+      <a:defRPr kern="1200">
         <a:solidFill>
           <a:schemeClr val="tx1"/>
         </a:solidFill>
-        <a:latin typeface="+mn-lt"/>
+        <a:latin typeface="Arial" charset="0"/>
         <a:ea typeface="+mn-ea"/>
-        <a:cs typeface="+mn-cs"/>
+        <a:cs typeface="Arial" charset="0"/>
       </a:defRPr>
     </a:lvl6pPr>
     <a:lvl7pPr marL="2743200" algn="l" defTabSz="914400" rtl="0" eaLnBrk="1" latinLnBrk="0" hangingPunct="1">
-      <a:defRPr sz="1800" kern="1200">
+      <a:defRPr kern="1200">
         <a:solidFill>
           <a:schemeClr val="tx1"/>
         </a:solidFill>
-        <a:latin typeface="+mn-lt"/>
+        <a:latin typeface="Arial" charset="0"/>
         <a:ea typeface="+mn-ea"/>
-        <a:cs typeface="+mn-cs"/>
+        <a:cs typeface="Arial" charset="0"/>
       </a:defRPr>
     </a:lvl7pPr>
     <a:lvl8pPr marL="3200400" algn="l" defTabSz="914400" rtl="0" eaLnBrk="1" latinLnBrk="0" hangingPunct="1">
-      <a:defRPr sz="1800" kern="1200">
+      <a:defRPr kern="1200">
         <a:solidFill>
           <a:schemeClr val="tx1"/>
         </a:solidFill>
-        <a:latin typeface="+mn-lt"/>
+        <a:latin typeface="Arial" charset="0"/>
         <a:ea typeface="+mn-ea"/>
-        <a:cs typeface="+mn-cs"/>
+        <a:cs typeface="Arial" charset="0"/>
       </a:defRPr>
     </a:lvl8pPr>
     <a:lvl9pPr marL="3657600" algn="l" defTabSz="914400" rtl="0" eaLnBrk="1" latinLnBrk="0" hangingPunct="1">
-      <a:defRPr sz="1800" kern="1200">
+      <a:defRPr kern="1200">
         <a:solidFill>
           <a:schemeClr val="tx1"/>
         </a:solidFill>
-        <a:latin typeface="+mn-lt"/>
+        <a:latin typeface="Arial" charset="0"/>
         <a:ea typeface="+mn-ea"/>
-        <a:cs typeface="+mn-cs"/>
+        <a:cs typeface="Arial" charset="0"/>
       </a:defRPr>
     </a:lvl9pPr>
   </p:defaultTextStyle>
@@ -156,11 +188,23 @@
         <p:txBody>
           <a:bodyPr vert="horz" lIns="91440" tIns="45720" rIns="91440" bIns="45720" rtlCol="0"/>
           <a:lstStyle>
-            <a:lvl1pPr algn="l">
-              <a:defRPr sz="1200"/>
+            <a:lvl1pPr algn="l" fontAlgn="auto">
+              <a:spcBef>
+                <a:spcPts val="0"/>
+              </a:spcBef>
+              <a:spcAft>
+                <a:spcPts val="0"/>
+              </a:spcAft>
+              <a:defRPr sz="1200">
+                <a:latin typeface="+mn-lt"/>
+                <a:cs typeface="+mn-cs"/>
+              </a:defRPr>
             </a:lvl1pPr>
           </a:lstStyle>
           <a:p>
+            <a:pPr>
+              <a:defRPr/>
+            </a:pPr>
             <a:endParaRPr lang="en-US"/>
           </a:p>
         </p:txBody>
@@ -187,14 +231,29 @@
         <p:txBody>
           <a:bodyPr vert="horz" lIns="91440" tIns="45720" rIns="91440" bIns="45720" rtlCol="0"/>
           <a:lstStyle>
-            <a:lvl1pPr algn="r">
-              <a:defRPr sz="1200"/>
+            <a:lvl1pPr algn="r" fontAlgn="auto">
+              <a:spcBef>
+                <a:spcPts val="0"/>
+              </a:spcBef>
+              <a:spcAft>
+                <a:spcPts val="0"/>
+              </a:spcAft>
+              <a:defRPr sz="1200" smtClean="0">
+                <a:latin typeface="+mn-lt"/>
+                <a:cs typeface="+mn-cs"/>
+              </a:defRPr>
             </a:lvl1pPr>
           </a:lstStyle>
           <a:p>
-            <a:fld id="{DDFAF77D-EAA4-46B8-A8FF-CCA63D3C9830}" type="datetimeFigureOut">
-              <a:rPr lang="en-US" smtClean="0"/>
-              <a:t>4/16/2016</a:t>
+            <a:pPr>
+              <a:defRPr/>
+            </a:pPr>
+            <a:fld id="{2EC403D5-5F58-44B4-8EB8-F7A634CEB1C3}" type="datetimeFigureOut">
+              <a:rPr lang="en-US"/>
+              <a:pPr>
+                <a:defRPr/>
+              </a:pPr>
+              <a:t>4/18/2016</a:t>
             </a:fld>
             <a:endParaRPr lang="en-US"/>
           </a:p>
@@ -229,7 +288,8 @@
           <a:bodyPr vert="horz" lIns="91440" tIns="45720" rIns="91440" bIns="45720" rtlCol="0" anchor="ctr"/>
           <a:lstStyle/>
           <a:p>
-            <a:endParaRPr lang="en-US"/>
+            <a:pPr lvl="0"/>
+            <a:endParaRPr lang="en-US" noProof="0"/>
           </a:p>
         </p:txBody>
       </p:sp>
@@ -258,38 +318,38 @@
           <a:p>
             <a:pPr lvl="0"/>
             <a:r>
-              <a:rPr lang="en-US" smtClean="0"/>
+              <a:rPr lang="en-US" noProof="0" smtClean="0"/>
               <a:t>Click to edit Master text styles</a:t>
             </a:r>
           </a:p>
           <a:p>
             <a:pPr lvl="1"/>
             <a:r>
-              <a:rPr lang="en-US" smtClean="0"/>
+              <a:rPr lang="en-US" noProof="0" smtClean="0"/>
               <a:t>Second level</a:t>
             </a:r>
           </a:p>
           <a:p>
             <a:pPr lvl="2"/>
             <a:r>
-              <a:rPr lang="en-US" smtClean="0"/>
+              <a:rPr lang="en-US" noProof="0" smtClean="0"/>
               <a:t>Third level</a:t>
             </a:r>
           </a:p>
           <a:p>
             <a:pPr lvl="3"/>
             <a:r>
-              <a:rPr lang="en-US" smtClean="0"/>
+              <a:rPr lang="en-US" noProof="0" smtClean="0"/>
               <a:t>Fourth level</a:t>
             </a:r>
           </a:p>
           <a:p>
             <a:pPr lvl="4"/>
             <a:r>
-              <a:rPr lang="en-US" smtClean="0"/>
+              <a:rPr lang="en-US" noProof="0" smtClean="0"/>
               <a:t>Fifth level</a:t>
             </a:r>
-            <a:endParaRPr lang="en-US"/>
+            <a:endParaRPr lang="en-US" noProof="0"/>
           </a:p>
         </p:txBody>
       </p:sp>
@@ -315,11 +375,23 @@
         <p:txBody>
           <a:bodyPr vert="horz" lIns="91440" tIns="45720" rIns="91440" bIns="45720" rtlCol="0" anchor="b"/>
           <a:lstStyle>
-            <a:lvl1pPr algn="l">
-              <a:defRPr sz="1200"/>
+            <a:lvl1pPr algn="l" fontAlgn="auto">
+              <a:spcBef>
+                <a:spcPts val="0"/>
+              </a:spcBef>
+              <a:spcAft>
+                <a:spcPts val="0"/>
+              </a:spcAft>
+              <a:defRPr sz="1200">
+                <a:latin typeface="+mn-lt"/>
+                <a:cs typeface="+mn-cs"/>
+              </a:defRPr>
             </a:lvl1pPr>
           </a:lstStyle>
           <a:p>
+            <a:pPr>
+              <a:defRPr/>
+            </a:pPr>
             <a:endParaRPr lang="en-US"/>
           </a:p>
         </p:txBody>
@@ -346,13 +418,28 @@
         <p:txBody>
           <a:bodyPr vert="horz" lIns="91440" tIns="45720" rIns="91440" bIns="45720" rtlCol="0" anchor="b"/>
           <a:lstStyle>
-            <a:lvl1pPr algn="r">
-              <a:defRPr sz="1200"/>
+            <a:lvl1pPr algn="r" fontAlgn="auto">
+              <a:spcBef>
+                <a:spcPts val="0"/>
+              </a:spcBef>
+              <a:spcAft>
+                <a:spcPts val="0"/>
+              </a:spcAft>
+              <a:defRPr sz="1200" smtClean="0">
+                <a:latin typeface="+mn-lt"/>
+                <a:cs typeface="+mn-cs"/>
+              </a:defRPr>
             </a:lvl1pPr>
           </a:lstStyle>
           <a:p>
-            <a:fld id="{1E682525-80F8-48B3-A4C6-4953B0F5C1EC}" type="slidenum">
-              <a:rPr lang="en-US" smtClean="0"/>
+            <a:pPr>
+              <a:defRPr/>
+            </a:pPr>
+            <a:fld id="{5B52776A-15D1-462B-AC63-5D7F8FBF57A9}" type="slidenum">
+              <a:rPr lang="en-US"/>
+              <a:pPr>
+                <a:defRPr/>
+              </a:pPr>
               <a:t>‹#›</a:t>
             </a:fld>
             <a:endParaRPr lang="en-US"/>
@@ -360,15 +447,16 @@
         </p:txBody>
       </p:sp>
     </p:spTree>
-    <p:extLst>
-      <p:ext uri="{BB962C8B-B14F-4D97-AF65-F5344CB8AC3E}">
-        <p14:creationId xmlns:p14="http://schemas.microsoft.com/office/powerpoint/2010/main" val="2090988901"/>
-      </p:ext>
-    </p:extLst>
   </p:cSld>
   <p:clrMap bg1="lt1" tx1="dk1" bg2="lt2" tx2="dk2" accent1="accent1" accent2="accent2" accent3="accent3" accent4="accent4" accent5="accent5" accent6="accent6" hlink="hlink" folHlink="folHlink"/>
   <p:notesStyle>
-    <a:lvl1pPr marL="0" algn="l" defTabSz="914400" rtl="0" eaLnBrk="1" latinLnBrk="0" hangingPunct="1">
+    <a:lvl1pPr algn="l" rtl="0" fontAlgn="base">
+      <a:spcBef>
+        <a:spcPct val="30000"/>
+      </a:spcBef>
+      <a:spcAft>
+        <a:spcPct val="0"/>
+      </a:spcAft>
       <a:defRPr sz="1200" kern="1200">
         <a:solidFill>
           <a:schemeClr val="tx1"/>
@@ -378,7 +466,13 @@
         <a:cs typeface="+mn-cs"/>
       </a:defRPr>
     </a:lvl1pPr>
-    <a:lvl2pPr marL="457200" algn="l" defTabSz="914400" rtl="0" eaLnBrk="1" latinLnBrk="0" hangingPunct="1">
+    <a:lvl2pPr marL="457200" algn="l" rtl="0" fontAlgn="base">
+      <a:spcBef>
+        <a:spcPct val="30000"/>
+      </a:spcBef>
+      <a:spcAft>
+        <a:spcPct val="0"/>
+      </a:spcAft>
       <a:defRPr sz="1200" kern="1200">
         <a:solidFill>
           <a:schemeClr val="tx1"/>
@@ -388,7 +482,13 @@
         <a:cs typeface="+mn-cs"/>
       </a:defRPr>
     </a:lvl2pPr>
-    <a:lvl3pPr marL="914400" algn="l" defTabSz="914400" rtl="0" eaLnBrk="1" latinLnBrk="0" hangingPunct="1">
+    <a:lvl3pPr marL="914400" algn="l" rtl="0" fontAlgn="base">
+      <a:spcBef>
+        <a:spcPct val="30000"/>
+      </a:spcBef>
+      <a:spcAft>
+        <a:spcPct val="0"/>
+      </a:spcAft>
       <a:defRPr sz="1200" kern="1200">
         <a:solidFill>
           <a:schemeClr val="tx1"/>
@@ -398,7 +498,13 @@
         <a:cs typeface="+mn-cs"/>
       </a:defRPr>
     </a:lvl3pPr>
-    <a:lvl4pPr marL="1371600" algn="l" defTabSz="914400" rtl="0" eaLnBrk="1" latinLnBrk="0" hangingPunct="1">
+    <a:lvl4pPr marL="1371600" algn="l" rtl="0" fontAlgn="base">
+      <a:spcBef>
+        <a:spcPct val="30000"/>
+      </a:spcBef>
+      <a:spcAft>
+        <a:spcPct val="0"/>
+      </a:spcAft>
       <a:defRPr sz="1200" kern="1200">
         <a:solidFill>
           <a:schemeClr val="tx1"/>
@@ -408,7 +514,13 @@
         <a:cs typeface="+mn-cs"/>
       </a:defRPr>
     </a:lvl4pPr>
-    <a:lvl5pPr marL="1828800" algn="l" defTabSz="914400" rtl="0" eaLnBrk="1" latinLnBrk="0" hangingPunct="1">
+    <a:lvl5pPr marL="1828800" algn="l" rtl="0" fontAlgn="base">
+      <a:spcBef>
+        <a:spcPct val="30000"/>
+      </a:spcBef>
+      <a:spcAft>
+        <a:spcPct val="0"/>
+      </a:spcAft>
       <a:defRPr sz="1200" kern="1200">
         <a:solidFill>
           <a:schemeClr val="tx1"/>
@@ -481,7 +593,7 @@
       </p:grpSpPr>
       <p:sp>
         <p:nvSpPr>
-          <p:cNvPr id="2" name="Slide Image Placeholder 1"/>
+          <p:cNvPr id="16385" name="Slide Image Placeholder 1"/>
           <p:cNvSpPr>
             <a:spLocks noGrp="1" noRot="1" noChangeAspect="1"/>
           </p:cNvSpPr>
@@ -489,154 +601,190 @@
             <p:ph type="sldImg"/>
           </p:nvPr>
         </p:nvSpPr>
+        <p:spPr bwMode="auto">
+          <a:noFill/>
+          <a:ln>
+            <a:solidFill>
+              <a:srgbClr val="000000"/>
+            </a:solidFill>
+            <a:miter lim="800000"/>
+            <a:headEnd/>
+            <a:tailEnd/>
+          </a:ln>
+        </p:spPr>
+      </p:sp>
+      <p:sp>
+        <p:nvSpPr>
+          <p:cNvPr id="3" name="Notes Placeholder 2"/>
+          <p:cNvSpPr>
+            <a:spLocks noGrp="1"/>
+          </p:cNvSpPr>
+          <p:nvPr>
+            <p:ph type="body" idx="1"/>
+          </p:nvPr>
+        </p:nvSpPr>
         <p:spPr/>
-      </p:sp>
-      <p:sp>
-        <p:nvSpPr>
-          <p:cNvPr id="3" name="Notes Placeholder 2"/>
-          <p:cNvSpPr>
-            <a:spLocks noGrp="1"/>
-          </p:cNvSpPr>
-          <p:nvPr>
-            <p:ph type="body" idx="1"/>
-          </p:nvPr>
-        </p:nvSpPr>
-        <p:spPr/>
         <p:txBody>
           <a:bodyPr/>
           <a:lstStyle/>
           <a:p>
-            <a:r>
-              <a:rPr lang="en-US" dirty="0" smtClean="0"/>
-              <a:t>Eliminated redundancy</a:t>
-            </a:r>
-            <a:r>
-              <a:rPr lang="en-US" baseline="0" dirty="0" smtClean="0"/>
-              <a:t> in data storage by creating tables in BCNF (all functional dependencies are key constraints)</a:t>
-            </a:r>
-          </a:p>
-          <a:p>
-            <a:pPr marL="171450" marR="0" indent="-171450" algn="l" defTabSz="914400" rtl="0" eaLnBrk="1" fontAlgn="auto" latinLnBrk="0" hangingPunct="1">
-              <a:lnSpc>
-                <a:spcPct val="100000"/>
-              </a:lnSpc>
+            <a:pPr fontAlgn="auto">
               <a:spcBef>
                 <a:spcPts val="0"/>
               </a:spcBef>
               <a:spcAft>
                 <a:spcPts val="0"/>
               </a:spcAft>
-              <a:buClrTx/>
-              <a:buSzTx/>
+              <a:defRPr/>
+            </a:pPr>
+            <a:r>
+              <a:rPr lang="en-US" dirty="0" smtClean="0"/>
+              <a:t>Eliminated redundancy in data storage by creating tables in BCNF (all functional dependencies are key constraints)</a:t>
+            </a:r>
+          </a:p>
+          <a:p>
+            <a:pPr marL="171450" indent="-171450" fontAlgn="auto">
+              <a:spcBef>
+                <a:spcPts val="0"/>
+              </a:spcBef>
+              <a:spcAft>
+                <a:spcPts val="0"/>
+              </a:spcAft>
               <a:buFont typeface="Arial" panose="020B0604020202020204" pitchFamily="34" charset="0"/>
               <a:buChar char="•"/>
-              <a:tabLst/>
-              <a:defRPr/>
-            </a:pPr>
-            <a:r>
-              <a:rPr lang="en-US" baseline="0" dirty="0" smtClean="0"/>
+              <a:defRPr/>
+            </a:pPr>
+            <a:r>
+              <a:rPr lang="en-US" dirty="0" smtClean="0"/>
               <a:t>You may wonder about GPA column for </a:t>
             </a:r>
             <a:r>
-              <a:rPr lang="en-US" baseline="0" dirty="0" err="1" smtClean="0"/>
+              <a:rPr lang="en-US" dirty="0" err="1" smtClean="0"/>
               <a:t>NomineeInfoTable</a:t>
             </a:r>
             <a:r>
-              <a:rPr lang="en-US" baseline="0" dirty="0" smtClean="0"/>
+              <a:rPr lang="en-US" dirty="0" smtClean="0"/>
               <a:t>. While GPA is affected by grades in courses, the requirements imply that it cannot be calculated from them alone. (otherwise, why would the requirement require that the nominee input the GPA as part of the form)?</a:t>
             </a:r>
-            <a:endParaRPr lang="en-US" baseline="0" dirty="0" smtClean="0"/>
-          </a:p>
-          <a:p>
-            <a:pPr marL="171450" indent="-171450">
+          </a:p>
+          <a:p>
+            <a:pPr marL="171450" indent="-171450" fontAlgn="auto">
+              <a:spcBef>
+                <a:spcPts val="0"/>
+              </a:spcBef>
+              <a:spcAft>
+                <a:spcPts val="0"/>
+              </a:spcAft>
               <a:buFont typeface="Arial" panose="020B0604020202020204" pitchFamily="34" charset="0"/>
               <a:buChar char="•"/>
-            </a:pPr>
-            <a:r>
-              <a:rPr lang="en-US" baseline="0" dirty="0" smtClean="0"/>
+              <a:defRPr/>
+            </a:pPr>
+            <a:r>
+              <a:rPr lang="en-US" dirty="0" smtClean="0"/>
               <a:t>Note that </a:t>
             </a:r>
             <a:r>
-              <a:rPr lang="en-US" baseline="0" dirty="0" err="1" smtClean="0"/>
+              <a:rPr lang="en-US" dirty="0" err="1" smtClean="0"/>
               <a:t>NomineeInfoForm</a:t>
             </a:r>
             <a:r>
-              <a:rPr lang="en-US" baseline="0" dirty="0" smtClean="0"/>
+              <a:rPr lang="en-US" dirty="0" smtClean="0"/>
               <a:t> ISA </a:t>
             </a:r>
             <a:r>
-              <a:rPr lang="en-US" baseline="0" dirty="0" err="1" smtClean="0"/>
+              <a:rPr lang="en-US" dirty="0" err="1" smtClean="0"/>
               <a:t>NominationForm</a:t>
             </a:r>
             <a:r>
-              <a:rPr lang="en-US" baseline="0" dirty="0" smtClean="0"/>
+              <a:rPr lang="en-US" dirty="0" smtClean="0"/>
               <a:t>. This was done so that same info would not be stored in </a:t>
             </a:r>
             <a:r>
-              <a:rPr lang="en-US" baseline="0" dirty="0" err="1" smtClean="0"/>
+              <a:rPr lang="en-US" dirty="0" err="1" smtClean="0"/>
               <a:t>NomineeInfoForm</a:t>
             </a:r>
             <a:r>
-              <a:rPr lang="en-US" baseline="0" dirty="0" smtClean="0"/>
+              <a:rPr lang="en-US" dirty="0" smtClean="0"/>
               <a:t> (this info is pre-filled for nominee). Separation was important because New graduates do not have </a:t>
             </a:r>
             <a:r>
-              <a:rPr lang="en-US" baseline="0" dirty="0" err="1" smtClean="0"/>
+              <a:rPr lang="en-US" dirty="0" err="1" smtClean="0"/>
               <a:t>NomineeInfoForm</a:t>
             </a:r>
             <a:r>
-              <a:rPr lang="en-US" baseline="0" dirty="0" smtClean="0"/>
+              <a:rPr lang="en-US" dirty="0" smtClean="0"/>
               <a:t> entries.</a:t>
             </a:r>
           </a:p>
           <a:p>
-            <a:pPr marL="171450" indent="-171450">
+            <a:pPr marL="171450" indent="-171450" fontAlgn="auto">
+              <a:spcBef>
+                <a:spcPts val="0"/>
+              </a:spcBef>
+              <a:spcAft>
+                <a:spcPts val="0"/>
+              </a:spcAft>
               <a:buFont typeface="Arial" panose="020B0604020202020204" pitchFamily="34" charset="0"/>
               <a:buChar char="•"/>
-            </a:pPr>
-            <a:r>
-              <a:rPr lang="en-US" baseline="0" dirty="0" smtClean="0"/>
+              <a:defRPr/>
+            </a:pPr>
+            <a:r>
+              <a:rPr lang="en-US" dirty="0" smtClean="0"/>
               <a:t>Also note that primary key for </a:t>
             </a:r>
             <a:r>
-              <a:rPr lang="en-US" baseline="0" dirty="0" err="1" smtClean="0"/>
+              <a:rPr lang="en-US" dirty="0" err="1" smtClean="0"/>
               <a:t>NominationForm</a:t>
             </a:r>
             <a:r>
-              <a:rPr lang="en-US" baseline="0" dirty="0" smtClean="0"/>
+              <a:rPr lang="en-US" dirty="0" smtClean="0"/>
               <a:t> is </a:t>
             </a:r>
             <a:r>
-              <a:rPr lang="en-US" baseline="0" dirty="0" err="1" smtClean="0"/>
+              <a:rPr lang="en-US" dirty="0" err="1" smtClean="0"/>
               <a:t>SessionID</a:t>
             </a:r>
             <a:r>
-              <a:rPr lang="en-US" baseline="0" dirty="0" smtClean="0"/>
+              <a:rPr lang="en-US" dirty="0" smtClean="0"/>
               <a:t> and PID. This is based on assumption that the same student cannot be nominated by two nominators in the same session.</a:t>
             </a:r>
           </a:p>
           <a:p>
-            <a:pPr marL="171450" indent="-171450">
+            <a:pPr marL="171450" indent="-171450" fontAlgn="auto">
+              <a:spcBef>
+                <a:spcPts val="0"/>
+              </a:spcBef>
+              <a:spcAft>
+                <a:spcPts val="0"/>
+              </a:spcAft>
               <a:buFont typeface="Arial" panose="020B0604020202020204" pitchFamily="34" charset="0"/>
               <a:buChar char="•"/>
-            </a:pPr>
-            <a:r>
-              <a:rPr lang="en-US" baseline="0" dirty="0" smtClean="0"/>
+              <a:defRPr/>
+            </a:pPr>
+            <a:r>
+              <a:rPr lang="en-US" dirty="0" smtClean="0"/>
               <a:t>It’s important to store </a:t>
             </a:r>
             <a:r>
-              <a:rPr lang="en-US" baseline="0" dirty="0" err="1" smtClean="0"/>
+              <a:rPr lang="en-US" dirty="0" err="1" smtClean="0"/>
               <a:t>GCMembersInSession</a:t>
             </a:r>
             <a:r>
-              <a:rPr lang="en-US" baseline="0" dirty="0" smtClean="0"/>
+              <a:rPr lang="en-US" dirty="0" smtClean="0"/>
               <a:t> so that former GC Members do not accidentally have ability to create scores for current session. </a:t>
             </a:r>
           </a:p>
           <a:p>
-            <a:pPr marL="171450" indent="-171450">
+            <a:pPr marL="171450" indent="-171450" fontAlgn="auto">
+              <a:spcBef>
+                <a:spcPts val="0"/>
+              </a:spcBef>
+              <a:spcAft>
+                <a:spcPts val="0"/>
+              </a:spcAft>
               <a:buFont typeface="Arial" panose="020B0604020202020204" pitchFamily="34" charset="0"/>
               <a:buChar char="•"/>
+              <a:defRPr/>
             </a:pPr>
             <a:endParaRPr lang="en-US" dirty="0"/>
           </a:p>
@@ -644,33 +792,59 @@
       </p:sp>
       <p:sp>
         <p:nvSpPr>
-          <p:cNvPr id="4" name="Slide Number Placeholder 3"/>
-          <p:cNvSpPr>
-            <a:spLocks noGrp="1"/>
-          </p:cNvSpPr>
-          <p:nvPr>
-            <p:ph type="sldNum" sz="quarter" idx="10"/>
-          </p:nvPr>
-        </p:nvSpPr>
-        <p:spPr/>
-        <p:txBody>
-          <a:bodyPr/>
+          <p:cNvPr id="16387" name="Slide Number Placeholder 3"/>
+          <p:cNvSpPr>
+            <a:spLocks noGrp="1"/>
+          </p:cNvSpPr>
+          <p:nvPr>
+            <p:ph type="sldNum" sz="quarter" idx="5"/>
+          </p:nvPr>
+        </p:nvSpPr>
+        <p:spPr bwMode="auto">
+          <a:noFill/>
+          <a:ln>
+            <a:miter lim="800000"/>
+            <a:headEnd/>
+            <a:tailEnd/>
+          </a:ln>
+        </p:spPr>
+        <p:txBody>
+          <a:bodyPr wrap="square" numCol="1" anchorCtr="0" compatLnSpc="1">
+            <a:prstTxWarp prst="textNoShape">
+              <a:avLst/>
+            </a:prstTxWarp>
+          </a:bodyPr>
           <a:lstStyle/>
           <a:p>
-            <a:fld id="{1E682525-80F8-48B3-A4C6-4953B0F5C1EC}" type="slidenum">
-              <a:rPr lang="en-US" smtClean="0"/>
+            <a:pPr fontAlgn="base">
+              <a:spcBef>
+                <a:spcPct val="0"/>
+              </a:spcBef>
+              <a:spcAft>
+                <a:spcPct val="0"/>
+              </a:spcAft>
+            </a:pPr>
+            <a:fld id="{11D888A7-1B80-42D5-B477-191E5E0600D3}" type="slidenum">
+              <a:rPr lang="en-US">
+                <a:cs typeface="Arial" charset="0"/>
+              </a:rPr>
+              <a:pPr fontAlgn="base">
+                <a:spcBef>
+                  <a:spcPct val="0"/>
+                </a:spcBef>
+                <a:spcAft>
+                  <a:spcPct val="0"/>
+                </a:spcAft>
+              </a:pPr>
               <a:t>2</a:t>
             </a:fld>
-            <a:endParaRPr lang="en-US"/>
+            <a:endParaRPr lang="en-US">
+              <a:cs typeface="Arial" charset="0"/>
+            </a:endParaRPr>
           </a:p>
         </p:txBody>
       </p:sp>
     </p:spTree>
-    <p:extLst>
-      <p:ext uri="{BB962C8B-B14F-4D97-AF65-F5344CB8AC3E}">
-        <p14:creationId xmlns:p14="http://schemas.microsoft.com/office/powerpoint/2010/main" val="2850493801"/>
-      </p:ext>
-    </p:extLst>
   </p:cSld>
   <p:clrMapOvr>
     <a:masterClrMapping/>
@@ -805,11 +979,21 @@
         <p:spPr/>
         <p:txBody>
           <a:bodyPr/>
-          <a:lstStyle/>
-          <a:p>
-            <a:fld id="{A5A9A3C9-D83C-49C7-8F3F-93C805BF6DAA}" type="datetimeFigureOut">
-              <a:rPr lang="en-US" smtClean="0"/>
-              <a:t>4/16/2016</a:t>
+          <a:lstStyle>
+            <a:lvl1pPr>
+              <a:defRPr/>
+            </a:lvl1pPr>
+          </a:lstStyle>
+          <a:p>
+            <a:pPr>
+              <a:defRPr/>
+            </a:pPr>
+            <a:fld id="{367FB8D7-E53A-4731-9DD9-CBD07CF190CE}" type="datetimeFigureOut">
+              <a:rPr lang="en-US"/>
+              <a:pPr>
+                <a:defRPr/>
+              </a:pPr>
+              <a:t>4/18/2016</a:t>
             </a:fld>
             <a:endParaRPr lang="en-US"/>
           </a:p>
@@ -828,8 +1012,15 @@
         <p:spPr/>
         <p:txBody>
           <a:bodyPr/>
-          <a:lstStyle/>
-          <a:p>
+          <a:lstStyle>
+            <a:lvl1pPr>
+              <a:defRPr/>
+            </a:lvl1pPr>
+          </a:lstStyle>
+          <a:p>
+            <a:pPr>
+              <a:defRPr/>
+            </a:pPr>
             <a:endParaRPr lang="en-US"/>
           </a:p>
         </p:txBody>
@@ -847,10 +1038,20 @@
         <p:spPr/>
         <p:txBody>
           <a:bodyPr/>
-          <a:lstStyle/>
-          <a:p>
-            <a:fld id="{17CBEA34-C929-4AD0-8188-382F7E640583}" type="slidenum">
-              <a:rPr lang="en-US" smtClean="0"/>
+          <a:lstStyle>
+            <a:lvl1pPr>
+              <a:defRPr/>
+            </a:lvl1pPr>
+          </a:lstStyle>
+          <a:p>
+            <a:pPr>
+              <a:defRPr/>
+            </a:pPr>
+            <a:fld id="{D05B69B4-E4C4-4017-A561-80B34105967B}" type="slidenum">
+              <a:rPr lang="en-US"/>
+              <a:pPr>
+                <a:defRPr/>
+              </a:pPr>
               <a:t>‹#›</a:t>
             </a:fld>
             <a:endParaRPr lang="en-US"/>
@@ -858,11 +1059,6 @@
         </p:txBody>
       </p:sp>
     </p:spTree>
-    <p:extLst>
-      <p:ext uri="{BB962C8B-B14F-4D97-AF65-F5344CB8AC3E}">
-        <p14:creationId xmlns:p14="http://schemas.microsoft.com/office/powerpoint/2010/main" val="1742755912"/>
-      </p:ext>
-    </p:extLst>
   </p:cSld>
   <p:clrMapOvr>
     <a:masterClrMapping/>
@@ -975,11 +1171,21 @@
         <p:spPr/>
         <p:txBody>
           <a:bodyPr/>
-          <a:lstStyle/>
-          <a:p>
-            <a:fld id="{A5A9A3C9-D83C-49C7-8F3F-93C805BF6DAA}" type="datetimeFigureOut">
-              <a:rPr lang="en-US" smtClean="0"/>
-              <a:t>4/16/2016</a:t>
+          <a:lstStyle>
+            <a:lvl1pPr>
+              <a:defRPr/>
+            </a:lvl1pPr>
+          </a:lstStyle>
+          <a:p>
+            <a:pPr>
+              <a:defRPr/>
+            </a:pPr>
+            <a:fld id="{993A10A9-0578-4850-9F19-B0EC9FE5B6C3}" type="datetimeFigureOut">
+              <a:rPr lang="en-US"/>
+              <a:pPr>
+                <a:defRPr/>
+              </a:pPr>
+              <a:t>4/18/2016</a:t>
             </a:fld>
             <a:endParaRPr lang="en-US"/>
           </a:p>
@@ -998,8 +1204,15 @@
         <p:spPr/>
         <p:txBody>
           <a:bodyPr/>
-          <a:lstStyle/>
-          <a:p>
+          <a:lstStyle>
+            <a:lvl1pPr>
+              <a:defRPr/>
+            </a:lvl1pPr>
+          </a:lstStyle>
+          <a:p>
+            <a:pPr>
+              <a:defRPr/>
+            </a:pPr>
             <a:endParaRPr lang="en-US"/>
           </a:p>
         </p:txBody>
@@ -1017,10 +1230,20 @@
         <p:spPr/>
         <p:txBody>
           <a:bodyPr/>
-          <a:lstStyle/>
-          <a:p>
-            <a:fld id="{17CBEA34-C929-4AD0-8188-382F7E640583}" type="slidenum">
-              <a:rPr lang="en-US" smtClean="0"/>
+          <a:lstStyle>
+            <a:lvl1pPr>
+              <a:defRPr/>
+            </a:lvl1pPr>
+          </a:lstStyle>
+          <a:p>
+            <a:pPr>
+              <a:defRPr/>
+            </a:pPr>
+            <a:fld id="{657137EE-BE47-4F18-93F1-CBCFE73101CD}" type="slidenum">
+              <a:rPr lang="en-US"/>
+              <a:pPr>
+                <a:defRPr/>
+              </a:pPr>
               <a:t>‹#›</a:t>
             </a:fld>
             <a:endParaRPr lang="en-US"/>
@@ -1028,11 +1251,6 @@
         </p:txBody>
       </p:sp>
     </p:spTree>
-    <p:extLst>
-      <p:ext uri="{BB962C8B-B14F-4D97-AF65-F5344CB8AC3E}">
-        <p14:creationId xmlns:p14="http://schemas.microsoft.com/office/powerpoint/2010/main" val="450723426"/>
-      </p:ext>
-    </p:extLst>
   </p:cSld>
   <p:clrMapOvr>
     <a:masterClrMapping/>
@@ -1155,11 +1373,21 @@
         <p:spPr/>
         <p:txBody>
           <a:bodyPr/>
-          <a:lstStyle/>
-          <a:p>
-            <a:fld id="{A5A9A3C9-D83C-49C7-8F3F-93C805BF6DAA}" type="datetimeFigureOut">
-              <a:rPr lang="en-US" smtClean="0"/>
-              <a:t>4/16/2016</a:t>
+          <a:lstStyle>
+            <a:lvl1pPr>
+              <a:defRPr/>
+            </a:lvl1pPr>
+          </a:lstStyle>
+          <a:p>
+            <a:pPr>
+              <a:defRPr/>
+            </a:pPr>
+            <a:fld id="{D9A222A7-C88C-4D79-ADC0-945F03D9EDDA}" type="datetimeFigureOut">
+              <a:rPr lang="en-US"/>
+              <a:pPr>
+                <a:defRPr/>
+              </a:pPr>
+              <a:t>4/18/2016</a:t>
             </a:fld>
             <a:endParaRPr lang="en-US"/>
           </a:p>
@@ -1178,8 +1406,15 @@
         <p:spPr/>
         <p:txBody>
           <a:bodyPr/>
-          <a:lstStyle/>
-          <a:p>
+          <a:lstStyle>
+            <a:lvl1pPr>
+              <a:defRPr/>
+            </a:lvl1pPr>
+          </a:lstStyle>
+          <a:p>
+            <a:pPr>
+              <a:defRPr/>
+            </a:pPr>
             <a:endParaRPr lang="en-US"/>
           </a:p>
         </p:txBody>
@@ -1197,10 +1432,20 @@
         <p:spPr/>
         <p:txBody>
           <a:bodyPr/>
-          <a:lstStyle/>
-          <a:p>
-            <a:fld id="{17CBEA34-C929-4AD0-8188-382F7E640583}" type="slidenum">
-              <a:rPr lang="en-US" smtClean="0"/>
+          <a:lstStyle>
+            <a:lvl1pPr>
+              <a:defRPr/>
+            </a:lvl1pPr>
+          </a:lstStyle>
+          <a:p>
+            <a:pPr>
+              <a:defRPr/>
+            </a:pPr>
+            <a:fld id="{37FA3649-A4BC-43EA-8714-CD61ADE17E74}" type="slidenum">
+              <a:rPr lang="en-US"/>
+              <a:pPr>
+                <a:defRPr/>
+              </a:pPr>
               <a:t>‹#›</a:t>
             </a:fld>
             <a:endParaRPr lang="en-US"/>
@@ -1208,11 +1453,6 @@
         </p:txBody>
       </p:sp>
     </p:spTree>
-    <p:extLst>
-      <p:ext uri="{BB962C8B-B14F-4D97-AF65-F5344CB8AC3E}">
-        <p14:creationId xmlns:p14="http://schemas.microsoft.com/office/powerpoint/2010/main" val="3385257593"/>
-      </p:ext>
-    </p:extLst>
   </p:cSld>
   <p:clrMapOvr>
     <a:masterClrMapping/>
@@ -1325,11 +1565,21 @@
         <p:spPr/>
         <p:txBody>
           <a:bodyPr/>
-          <a:lstStyle/>
-          <a:p>
-            <a:fld id="{A5A9A3C9-D83C-49C7-8F3F-93C805BF6DAA}" type="datetimeFigureOut">
-              <a:rPr lang="en-US" smtClean="0"/>
-              <a:t>4/16/2016</a:t>
+          <a:lstStyle>
+            <a:lvl1pPr>
+              <a:defRPr/>
+            </a:lvl1pPr>
+          </a:lstStyle>
+          <a:p>
+            <a:pPr>
+              <a:defRPr/>
+            </a:pPr>
+            <a:fld id="{B10EB66F-70D8-46AE-9F45-5D010DDCF5A5}" type="datetimeFigureOut">
+              <a:rPr lang="en-US"/>
+              <a:pPr>
+                <a:defRPr/>
+              </a:pPr>
+              <a:t>4/18/2016</a:t>
             </a:fld>
             <a:endParaRPr lang="en-US"/>
           </a:p>
@@ -1348,8 +1598,15 @@
         <p:spPr/>
         <p:txBody>
           <a:bodyPr/>
-          <a:lstStyle/>
-          <a:p>
+          <a:lstStyle>
+            <a:lvl1pPr>
+              <a:defRPr/>
+            </a:lvl1pPr>
+          </a:lstStyle>
+          <a:p>
+            <a:pPr>
+              <a:defRPr/>
+            </a:pPr>
             <a:endParaRPr lang="en-US"/>
           </a:p>
         </p:txBody>
@@ -1367,10 +1624,20 @@
         <p:spPr/>
         <p:txBody>
           <a:bodyPr/>
-          <a:lstStyle/>
-          <a:p>
-            <a:fld id="{17CBEA34-C929-4AD0-8188-382F7E640583}" type="slidenum">
-              <a:rPr lang="en-US" smtClean="0"/>
+          <a:lstStyle>
+            <a:lvl1pPr>
+              <a:defRPr/>
+            </a:lvl1pPr>
+          </a:lstStyle>
+          <a:p>
+            <a:pPr>
+              <a:defRPr/>
+            </a:pPr>
+            <a:fld id="{E9F7312C-54DB-46CA-A435-324ECF7A9909}" type="slidenum">
+              <a:rPr lang="en-US"/>
+              <a:pPr>
+                <a:defRPr/>
+              </a:pPr>
               <a:t>‹#›</a:t>
             </a:fld>
             <a:endParaRPr lang="en-US"/>
@@ -1378,11 +1645,6 @@
         </p:txBody>
       </p:sp>
     </p:spTree>
-    <p:extLst>
-      <p:ext uri="{BB962C8B-B14F-4D97-AF65-F5344CB8AC3E}">
-        <p14:creationId xmlns:p14="http://schemas.microsoft.com/office/powerpoint/2010/main" val="2313273737"/>
-      </p:ext>
-    </p:extLst>
   </p:cSld>
   <p:clrMapOvr>
     <a:masterClrMapping/>
@@ -1571,11 +1833,21 @@
         <p:spPr/>
         <p:txBody>
           <a:bodyPr/>
-          <a:lstStyle/>
-          <a:p>
-            <a:fld id="{A5A9A3C9-D83C-49C7-8F3F-93C805BF6DAA}" type="datetimeFigureOut">
-              <a:rPr lang="en-US" smtClean="0"/>
-              <a:t>4/16/2016</a:t>
+          <a:lstStyle>
+            <a:lvl1pPr>
+              <a:defRPr/>
+            </a:lvl1pPr>
+          </a:lstStyle>
+          <a:p>
+            <a:pPr>
+              <a:defRPr/>
+            </a:pPr>
+            <a:fld id="{238021EC-CE46-4147-BF60-E7CA72AB5B93}" type="datetimeFigureOut">
+              <a:rPr lang="en-US"/>
+              <a:pPr>
+                <a:defRPr/>
+              </a:pPr>
+              <a:t>4/18/2016</a:t>
             </a:fld>
             <a:endParaRPr lang="en-US"/>
           </a:p>
@@ -1594,8 +1866,15 @@
         <p:spPr/>
         <p:txBody>
           <a:bodyPr/>
-          <a:lstStyle/>
-          <a:p>
+          <a:lstStyle>
+            <a:lvl1pPr>
+              <a:defRPr/>
+            </a:lvl1pPr>
+          </a:lstStyle>
+          <a:p>
+            <a:pPr>
+              <a:defRPr/>
+            </a:pPr>
             <a:endParaRPr lang="en-US"/>
           </a:p>
         </p:txBody>
@@ -1613,10 +1892,20 @@
         <p:spPr/>
         <p:txBody>
           <a:bodyPr/>
-          <a:lstStyle/>
-          <a:p>
-            <a:fld id="{17CBEA34-C929-4AD0-8188-382F7E640583}" type="slidenum">
-              <a:rPr lang="en-US" smtClean="0"/>
+          <a:lstStyle>
+            <a:lvl1pPr>
+              <a:defRPr/>
+            </a:lvl1pPr>
+          </a:lstStyle>
+          <a:p>
+            <a:pPr>
+              <a:defRPr/>
+            </a:pPr>
+            <a:fld id="{1071E63E-7182-4A23-8587-610CA5CFA6D0}" type="slidenum">
+              <a:rPr lang="en-US"/>
+              <a:pPr>
+                <a:defRPr/>
+              </a:pPr>
               <a:t>‹#›</a:t>
             </a:fld>
             <a:endParaRPr lang="en-US"/>
@@ -1624,11 +1913,6 @@
         </p:txBody>
       </p:sp>
     </p:spTree>
-    <p:extLst>
-      <p:ext uri="{BB962C8B-B14F-4D97-AF65-F5344CB8AC3E}">
-        <p14:creationId xmlns:p14="http://schemas.microsoft.com/office/powerpoint/2010/main" val="1062956955"/>
-      </p:ext>
-    </p:extLst>
   </p:cSld>
   <p:clrMapOvr>
     <a:masterClrMapping/>
@@ -1792,7 +2076,7 @@
       </p:sp>
       <p:sp>
         <p:nvSpPr>
-          <p:cNvPr id="5" name="Date Placeholder 4"/>
+          <p:cNvPr id="5" name="Date Placeholder 3"/>
           <p:cNvSpPr>
             <a:spLocks noGrp="1"/>
           </p:cNvSpPr>
@@ -1803,11 +2087,21 @@
         <p:spPr/>
         <p:txBody>
           <a:bodyPr/>
-          <a:lstStyle/>
-          <a:p>
-            <a:fld id="{A5A9A3C9-D83C-49C7-8F3F-93C805BF6DAA}" type="datetimeFigureOut">
-              <a:rPr lang="en-US" smtClean="0"/>
-              <a:t>4/16/2016</a:t>
+          <a:lstStyle>
+            <a:lvl1pPr>
+              <a:defRPr/>
+            </a:lvl1pPr>
+          </a:lstStyle>
+          <a:p>
+            <a:pPr>
+              <a:defRPr/>
+            </a:pPr>
+            <a:fld id="{4B33A804-9016-4219-B166-C6320391F61E}" type="datetimeFigureOut">
+              <a:rPr lang="en-US"/>
+              <a:pPr>
+                <a:defRPr/>
+              </a:pPr>
+              <a:t>4/18/2016</a:t>
             </a:fld>
             <a:endParaRPr lang="en-US"/>
           </a:p>
@@ -1815,7 +2109,7 @@
       </p:sp>
       <p:sp>
         <p:nvSpPr>
-          <p:cNvPr id="6" name="Footer Placeholder 5"/>
+          <p:cNvPr id="6" name="Footer Placeholder 4"/>
           <p:cNvSpPr>
             <a:spLocks noGrp="1"/>
           </p:cNvSpPr>
@@ -1826,15 +2120,22 @@
         <p:spPr/>
         <p:txBody>
           <a:bodyPr/>
-          <a:lstStyle/>
-          <a:p>
-            <a:endParaRPr lang="en-US"/>
-          </a:p>
-        </p:txBody>
-      </p:sp>
-      <p:sp>
-        <p:nvSpPr>
-          <p:cNvPr id="7" name="Slide Number Placeholder 6"/>
+          <a:lstStyle>
+            <a:lvl1pPr>
+              <a:defRPr/>
+            </a:lvl1pPr>
+          </a:lstStyle>
+          <a:p>
+            <a:pPr>
+              <a:defRPr/>
+            </a:pPr>
+            <a:endParaRPr lang="en-US"/>
+          </a:p>
+        </p:txBody>
+      </p:sp>
+      <p:sp>
+        <p:nvSpPr>
+          <p:cNvPr id="7" name="Slide Number Placeholder 5"/>
           <p:cNvSpPr>
             <a:spLocks noGrp="1"/>
           </p:cNvSpPr>
@@ -1845,10 +2146,20 @@
         <p:spPr/>
         <p:txBody>
           <a:bodyPr/>
-          <a:lstStyle/>
-          <a:p>
-            <a:fld id="{17CBEA34-C929-4AD0-8188-382F7E640583}" type="slidenum">
-              <a:rPr lang="en-US" smtClean="0"/>
+          <a:lstStyle>
+            <a:lvl1pPr>
+              <a:defRPr/>
+            </a:lvl1pPr>
+          </a:lstStyle>
+          <a:p>
+            <a:pPr>
+              <a:defRPr/>
+            </a:pPr>
+            <a:fld id="{3C7A2760-6BDD-4096-955A-EE46CB589155}" type="slidenum">
+              <a:rPr lang="en-US"/>
+              <a:pPr>
+                <a:defRPr/>
+              </a:pPr>
               <a:t>‹#›</a:t>
             </a:fld>
             <a:endParaRPr lang="en-US"/>
@@ -1856,11 +2167,6 @@
         </p:txBody>
       </p:sp>
     </p:spTree>
-    <p:extLst>
-      <p:ext uri="{BB962C8B-B14F-4D97-AF65-F5344CB8AC3E}">
-        <p14:creationId xmlns:p14="http://schemas.microsoft.com/office/powerpoint/2010/main" val="1759242441"/>
-      </p:ext>
-    </p:extLst>
   </p:cSld>
   <p:clrMapOvr>
     <a:masterClrMapping/>
@@ -2159,7 +2465,7 @@
       </p:sp>
       <p:sp>
         <p:nvSpPr>
-          <p:cNvPr id="7" name="Date Placeholder 6"/>
+          <p:cNvPr id="7" name="Date Placeholder 3"/>
           <p:cNvSpPr>
             <a:spLocks noGrp="1"/>
           </p:cNvSpPr>
@@ -2170,11 +2476,21 @@
         <p:spPr/>
         <p:txBody>
           <a:bodyPr/>
-          <a:lstStyle/>
-          <a:p>
-            <a:fld id="{A5A9A3C9-D83C-49C7-8F3F-93C805BF6DAA}" type="datetimeFigureOut">
-              <a:rPr lang="en-US" smtClean="0"/>
-              <a:t>4/16/2016</a:t>
+          <a:lstStyle>
+            <a:lvl1pPr>
+              <a:defRPr/>
+            </a:lvl1pPr>
+          </a:lstStyle>
+          <a:p>
+            <a:pPr>
+              <a:defRPr/>
+            </a:pPr>
+            <a:fld id="{77F2D86A-3A1C-4A29-9980-2323DC4D81D4}" type="datetimeFigureOut">
+              <a:rPr lang="en-US"/>
+              <a:pPr>
+                <a:defRPr/>
+              </a:pPr>
+              <a:t>4/18/2016</a:t>
             </a:fld>
             <a:endParaRPr lang="en-US"/>
           </a:p>
@@ -2182,7 +2498,7 @@
       </p:sp>
       <p:sp>
         <p:nvSpPr>
-          <p:cNvPr id="8" name="Footer Placeholder 7"/>
+          <p:cNvPr id="8" name="Footer Placeholder 4"/>
           <p:cNvSpPr>
             <a:spLocks noGrp="1"/>
           </p:cNvSpPr>
@@ -2193,15 +2509,22 @@
         <p:spPr/>
         <p:txBody>
           <a:bodyPr/>
-          <a:lstStyle/>
-          <a:p>
-            <a:endParaRPr lang="en-US"/>
-          </a:p>
-        </p:txBody>
-      </p:sp>
-      <p:sp>
-        <p:nvSpPr>
-          <p:cNvPr id="9" name="Slide Number Placeholder 8"/>
+          <a:lstStyle>
+            <a:lvl1pPr>
+              <a:defRPr/>
+            </a:lvl1pPr>
+          </a:lstStyle>
+          <a:p>
+            <a:pPr>
+              <a:defRPr/>
+            </a:pPr>
+            <a:endParaRPr lang="en-US"/>
+          </a:p>
+        </p:txBody>
+      </p:sp>
+      <p:sp>
+        <p:nvSpPr>
+          <p:cNvPr id="9" name="Slide Number Placeholder 5"/>
           <p:cNvSpPr>
             <a:spLocks noGrp="1"/>
           </p:cNvSpPr>
@@ -2212,10 +2535,20 @@
         <p:spPr/>
         <p:txBody>
           <a:bodyPr/>
-          <a:lstStyle/>
-          <a:p>
-            <a:fld id="{17CBEA34-C929-4AD0-8188-382F7E640583}" type="slidenum">
-              <a:rPr lang="en-US" smtClean="0"/>
+          <a:lstStyle>
+            <a:lvl1pPr>
+              <a:defRPr/>
+            </a:lvl1pPr>
+          </a:lstStyle>
+          <a:p>
+            <a:pPr>
+              <a:defRPr/>
+            </a:pPr>
+            <a:fld id="{73BDB389-D336-4EF6-B722-C0CF5673A197}" type="slidenum">
+              <a:rPr lang="en-US"/>
+              <a:pPr>
+                <a:defRPr/>
+              </a:pPr>
               <a:t>‹#›</a:t>
             </a:fld>
             <a:endParaRPr lang="en-US"/>
@@ -2223,11 +2556,6 @@
         </p:txBody>
       </p:sp>
     </p:spTree>
-    <p:extLst>
-      <p:ext uri="{BB962C8B-B14F-4D97-AF65-F5344CB8AC3E}">
-        <p14:creationId xmlns:p14="http://schemas.microsoft.com/office/powerpoint/2010/main" val="323657420"/>
-      </p:ext>
-    </p:extLst>
   </p:cSld>
   <p:clrMapOvr>
     <a:masterClrMapping/>
@@ -2277,7 +2605,7 @@
       </p:sp>
       <p:sp>
         <p:nvSpPr>
-          <p:cNvPr id="3" name="Date Placeholder 2"/>
+          <p:cNvPr id="3" name="Date Placeholder 3"/>
           <p:cNvSpPr>
             <a:spLocks noGrp="1"/>
           </p:cNvSpPr>
@@ -2288,11 +2616,21 @@
         <p:spPr/>
         <p:txBody>
           <a:bodyPr/>
-          <a:lstStyle/>
-          <a:p>
-            <a:fld id="{A5A9A3C9-D83C-49C7-8F3F-93C805BF6DAA}" type="datetimeFigureOut">
-              <a:rPr lang="en-US" smtClean="0"/>
-              <a:t>4/16/2016</a:t>
+          <a:lstStyle>
+            <a:lvl1pPr>
+              <a:defRPr/>
+            </a:lvl1pPr>
+          </a:lstStyle>
+          <a:p>
+            <a:pPr>
+              <a:defRPr/>
+            </a:pPr>
+            <a:fld id="{0A7A8D7F-EA37-4828-8F43-10C63DA91E48}" type="datetimeFigureOut">
+              <a:rPr lang="en-US"/>
+              <a:pPr>
+                <a:defRPr/>
+              </a:pPr>
+              <a:t>4/18/2016</a:t>
             </a:fld>
             <a:endParaRPr lang="en-US"/>
           </a:p>
@@ -2300,7 +2638,7 @@
       </p:sp>
       <p:sp>
         <p:nvSpPr>
-          <p:cNvPr id="4" name="Footer Placeholder 3"/>
+          <p:cNvPr id="4" name="Footer Placeholder 4"/>
           <p:cNvSpPr>
             <a:spLocks noGrp="1"/>
           </p:cNvSpPr>
@@ -2311,15 +2649,22 @@
         <p:spPr/>
         <p:txBody>
           <a:bodyPr/>
-          <a:lstStyle/>
-          <a:p>
-            <a:endParaRPr lang="en-US"/>
-          </a:p>
-        </p:txBody>
-      </p:sp>
-      <p:sp>
-        <p:nvSpPr>
-          <p:cNvPr id="5" name="Slide Number Placeholder 4"/>
+          <a:lstStyle>
+            <a:lvl1pPr>
+              <a:defRPr/>
+            </a:lvl1pPr>
+          </a:lstStyle>
+          <a:p>
+            <a:pPr>
+              <a:defRPr/>
+            </a:pPr>
+            <a:endParaRPr lang="en-US"/>
+          </a:p>
+        </p:txBody>
+      </p:sp>
+      <p:sp>
+        <p:nvSpPr>
+          <p:cNvPr id="5" name="Slide Number Placeholder 5"/>
           <p:cNvSpPr>
             <a:spLocks noGrp="1"/>
           </p:cNvSpPr>
@@ -2330,10 +2675,20 @@
         <p:spPr/>
         <p:txBody>
           <a:bodyPr/>
-          <a:lstStyle/>
-          <a:p>
-            <a:fld id="{17CBEA34-C929-4AD0-8188-382F7E640583}" type="slidenum">
-              <a:rPr lang="en-US" smtClean="0"/>
+          <a:lstStyle>
+            <a:lvl1pPr>
+              <a:defRPr/>
+            </a:lvl1pPr>
+          </a:lstStyle>
+          <a:p>
+            <a:pPr>
+              <a:defRPr/>
+            </a:pPr>
+            <a:fld id="{9A66419C-1FDC-4547-8324-CE6EAD60785E}" type="slidenum">
+              <a:rPr lang="en-US"/>
+              <a:pPr>
+                <a:defRPr/>
+              </a:pPr>
               <a:t>‹#›</a:t>
             </a:fld>
             <a:endParaRPr lang="en-US"/>
@@ -2341,11 +2696,6 @@
         </p:txBody>
       </p:sp>
     </p:spTree>
-    <p:extLst>
-      <p:ext uri="{BB962C8B-B14F-4D97-AF65-F5344CB8AC3E}">
-        <p14:creationId xmlns:p14="http://schemas.microsoft.com/office/powerpoint/2010/main" val="196014422"/>
-      </p:ext>
-    </p:extLst>
   </p:cSld>
   <p:clrMapOvr>
     <a:masterClrMapping/>
@@ -2372,7 +2722,7 @@
       </p:grpSpPr>
       <p:sp>
         <p:nvSpPr>
-          <p:cNvPr id="2" name="Date Placeholder 1"/>
+          <p:cNvPr id="2" name="Date Placeholder 3"/>
           <p:cNvSpPr>
             <a:spLocks noGrp="1"/>
           </p:cNvSpPr>
@@ -2383,11 +2733,21 @@
         <p:spPr/>
         <p:txBody>
           <a:bodyPr/>
-          <a:lstStyle/>
-          <a:p>
-            <a:fld id="{A5A9A3C9-D83C-49C7-8F3F-93C805BF6DAA}" type="datetimeFigureOut">
-              <a:rPr lang="en-US" smtClean="0"/>
-              <a:t>4/16/2016</a:t>
+          <a:lstStyle>
+            <a:lvl1pPr>
+              <a:defRPr/>
+            </a:lvl1pPr>
+          </a:lstStyle>
+          <a:p>
+            <a:pPr>
+              <a:defRPr/>
+            </a:pPr>
+            <a:fld id="{7C6CB081-930C-4DCB-9B1D-66C1A4402DEC}" type="datetimeFigureOut">
+              <a:rPr lang="en-US"/>
+              <a:pPr>
+                <a:defRPr/>
+              </a:pPr>
+              <a:t>4/18/2016</a:t>
             </a:fld>
             <a:endParaRPr lang="en-US"/>
           </a:p>
@@ -2395,7 +2755,7 @@
       </p:sp>
       <p:sp>
         <p:nvSpPr>
-          <p:cNvPr id="3" name="Footer Placeholder 2"/>
+          <p:cNvPr id="3" name="Footer Placeholder 4"/>
           <p:cNvSpPr>
             <a:spLocks noGrp="1"/>
           </p:cNvSpPr>
@@ -2406,15 +2766,22 @@
         <p:spPr/>
         <p:txBody>
           <a:bodyPr/>
-          <a:lstStyle/>
-          <a:p>
-            <a:endParaRPr lang="en-US"/>
-          </a:p>
-        </p:txBody>
-      </p:sp>
-      <p:sp>
-        <p:nvSpPr>
-          <p:cNvPr id="4" name="Slide Number Placeholder 3"/>
+          <a:lstStyle>
+            <a:lvl1pPr>
+              <a:defRPr/>
+            </a:lvl1pPr>
+          </a:lstStyle>
+          <a:p>
+            <a:pPr>
+              <a:defRPr/>
+            </a:pPr>
+            <a:endParaRPr lang="en-US"/>
+          </a:p>
+        </p:txBody>
+      </p:sp>
+      <p:sp>
+        <p:nvSpPr>
+          <p:cNvPr id="4" name="Slide Number Placeholder 5"/>
           <p:cNvSpPr>
             <a:spLocks noGrp="1"/>
           </p:cNvSpPr>
@@ -2425,10 +2792,20 @@
         <p:spPr/>
         <p:txBody>
           <a:bodyPr/>
-          <a:lstStyle/>
-          <a:p>
-            <a:fld id="{17CBEA34-C929-4AD0-8188-382F7E640583}" type="slidenum">
-              <a:rPr lang="en-US" smtClean="0"/>
+          <a:lstStyle>
+            <a:lvl1pPr>
+              <a:defRPr/>
+            </a:lvl1pPr>
+          </a:lstStyle>
+          <a:p>
+            <a:pPr>
+              <a:defRPr/>
+            </a:pPr>
+            <a:fld id="{CE2CC5E7-B015-4BD5-8ABB-01FEA9CAEE66}" type="slidenum">
+              <a:rPr lang="en-US"/>
+              <a:pPr>
+                <a:defRPr/>
+              </a:pPr>
               <a:t>‹#›</a:t>
             </a:fld>
             <a:endParaRPr lang="en-US"/>
@@ -2436,11 +2813,6 @@
         </p:txBody>
       </p:sp>
     </p:spTree>
-    <p:extLst>
-      <p:ext uri="{BB962C8B-B14F-4D97-AF65-F5344CB8AC3E}">
-        <p14:creationId xmlns:p14="http://schemas.microsoft.com/office/powerpoint/2010/main" val="935891546"/>
-      </p:ext>
-    </p:extLst>
   </p:cSld>
   <p:clrMapOvr>
     <a:masterClrMapping/>
@@ -2649,7 +3021,7 @@
       </p:sp>
       <p:sp>
         <p:nvSpPr>
-          <p:cNvPr id="5" name="Date Placeholder 4"/>
+          <p:cNvPr id="5" name="Date Placeholder 3"/>
           <p:cNvSpPr>
             <a:spLocks noGrp="1"/>
           </p:cNvSpPr>
@@ -2660,11 +3032,21 @@
         <p:spPr/>
         <p:txBody>
           <a:bodyPr/>
-          <a:lstStyle/>
-          <a:p>
-            <a:fld id="{A5A9A3C9-D83C-49C7-8F3F-93C805BF6DAA}" type="datetimeFigureOut">
-              <a:rPr lang="en-US" smtClean="0"/>
-              <a:t>4/16/2016</a:t>
+          <a:lstStyle>
+            <a:lvl1pPr>
+              <a:defRPr/>
+            </a:lvl1pPr>
+          </a:lstStyle>
+          <a:p>
+            <a:pPr>
+              <a:defRPr/>
+            </a:pPr>
+            <a:fld id="{FD24F002-B8C1-4F09-8674-F6B867059C10}" type="datetimeFigureOut">
+              <a:rPr lang="en-US"/>
+              <a:pPr>
+                <a:defRPr/>
+              </a:pPr>
+              <a:t>4/18/2016</a:t>
             </a:fld>
             <a:endParaRPr lang="en-US"/>
           </a:p>
@@ -2672,7 +3054,7 @@
       </p:sp>
       <p:sp>
         <p:nvSpPr>
-          <p:cNvPr id="6" name="Footer Placeholder 5"/>
+          <p:cNvPr id="6" name="Footer Placeholder 4"/>
           <p:cNvSpPr>
             <a:spLocks noGrp="1"/>
           </p:cNvSpPr>
@@ -2683,15 +3065,22 @@
         <p:spPr/>
         <p:txBody>
           <a:bodyPr/>
-          <a:lstStyle/>
-          <a:p>
-            <a:endParaRPr lang="en-US"/>
-          </a:p>
-        </p:txBody>
-      </p:sp>
-      <p:sp>
-        <p:nvSpPr>
-          <p:cNvPr id="7" name="Slide Number Placeholder 6"/>
+          <a:lstStyle>
+            <a:lvl1pPr>
+              <a:defRPr/>
+            </a:lvl1pPr>
+          </a:lstStyle>
+          <a:p>
+            <a:pPr>
+              <a:defRPr/>
+            </a:pPr>
+            <a:endParaRPr lang="en-US"/>
+          </a:p>
+        </p:txBody>
+      </p:sp>
+      <p:sp>
+        <p:nvSpPr>
+          <p:cNvPr id="7" name="Slide Number Placeholder 5"/>
           <p:cNvSpPr>
             <a:spLocks noGrp="1"/>
           </p:cNvSpPr>
@@ -2702,10 +3091,20 @@
         <p:spPr/>
         <p:txBody>
           <a:bodyPr/>
-          <a:lstStyle/>
-          <a:p>
-            <a:fld id="{17CBEA34-C929-4AD0-8188-382F7E640583}" type="slidenum">
-              <a:rPr lang="en-US" smtClean="0"/>
+          <a:lstStyle>
+            <a:lvl1pPr>
+              <a:defRPr/>
+            </a:lvl1pPr>
+          </a:lstStyle>
+          <a:p>
+            <a:pPr>
+              <a:defRPr/>
+            </a:pPr>
+            <a:fld id="{A492FBDC-B4E2-45B5-AEB0-3DB855FAA1BE}" type="slidenum">
+              <a:rPr lang="en-US"/>
+              <a:pPr>
+                <a:defRPr/>
+              </a:pPr>
               <a:t>‹#›</a:t>
             </a:fld>
             <a:endParaRPr lang="en-US"/>
@@ -2713,11 +3112,6 @@
         </p:txBody>
       </p:sp>
     </p:spTree>
-    <p:extLst>
-      <p:ext uri="{BB962C8B-B14F-4D97-AF65-F5344CB8AC3E}">
-        <p14:creationId xmlns:p14="http://schemas.microsoft.com/office/powerpoint/2010/main" val="400236591"/>
-      </p:ext>
-    </p:extLst>
   </p:cSld>
   <p:clrMapOvr>
     <a:masterClrMapping/>
@@ -2791,7 +3185,9 @@
           </a:xfrm>
         </p:spPr>
         <p:txBody>
-          <a:bodyPr/>
+          <a:bodyPr rtlCol="0">
+            <a:normAutofit/>
+          </a:bodyPr>
           <a:lstStyle>
             <a:lvl1pPr marL="0" indent="0">
               <a:buNone/>
@@ -2831,7 +3227,8 @@
             </a:lvl9pPr>
           </a:lstStyle>
           <a:p>
-            <a:endParaRPr lang="en-US"/>
+            <a:pPr lvl="0"/>
+            <a:endParaRPr lang="en-US" noProof="0"/>
           </a:p>
         </p:txBody>
       </p:sp>
@@ -2902,7 +3299,7 @@
       </p:sp>
       <p:sp>
         <p:nvSpPr>
-          <p:cNvPr id="5" name="Date Placeholder 4"/>
+          <p:cNvPr id="5" name="Date Placeholder 3"/>
           <p:cNvSpPr>
             <a:spLocks noGrp="1"/>
           </p:cNvSpPr>
@@ -2913,11 +3310,21 @@
         <p:spPr/>
         <p:txBody>
           <a:bodyPr/>
-          <a:lstStyle/>
-          <a:p>
-            <a:fld id="{A5A9A3C9-D83C-49C7-8F3F-93C805BF6DAA}" type="datetimeFigureOut">
-              <a:rPr lang="en-US" smtClean="0"/>
-              <a:t>4/16/2016</a:t>
+          <a:lstStyle>
+            <a:lvl1pPr>
+              <a:defRPr/>
+            </a:lvl1pPr>
+          </a:lstStyle>
+          <a:p>
+            <a:pPr>
+              <a:defRPr/>
+            </a:pPr>
+            <a:fld id="{C9A84233-04E4-418D-8EDA-E586C7F09EC8}" type="datetimeFigureOut">
+              <a:rPr lang="en-US"/>
+              <a:pPr>
+                <a:defRPr/>
+              </a:pPr>
+              <a:t>4/18/2016</a:t>
             </a:fld>
             <a:endParaRPr lang="en-US"/>
           </a:p>
@@ -2925,7 +3332,7 @@
       </p:sp>
       <p:sp>
         <p:nvSpPr>
-          <p:cNvPr id="6" name="Footer Placeholder 5"/>
+          <p:cNvPr id="6" name="Footer Placeholder 4"/>
           <p:cNvSpPr>
             <a:spLocks noGrp="1"/>
           </p:cNvSpPr>
@@ -2936,15 +3343,22 @@
         <p:spPr/>
         <p:txBody>
           <a:bodyPr/>
-          <a:lstStyle/>
-          <a:p>
-            <a:endParaRPr lang="en-US"/>
-          </a:p>
-        </p:txBody>
-      </p:sp>
-      <p:sp>
-        <p:nvSpPr>
-          <p:cNvPr id="7" name="Slide Number Placeholder 6"/>
+          <a:lstStyle>
+            <a:lvl1pPr>
+              <a:defRPr/>
+            </a:lvl1pPr>
+          </a:lstStyle>
+          <a:p>
+            <a:pPr>
+              <a:defRPr/>
+            </a:pPr>
+            <a:endParaRPr lang="en-US"/>
+          </a:p>
+        </p:txBody>
+      </p:sp>
+      <p:sp>
+        <p:nvSpPr>
+          <p:cNvPr id="7" name="Slide Number Placeholder 5"/>
           <p:cNvSpPr>
             <a:spLocks noGrp="1"/>
           </p:cNvSpPr>
@@ -2955,10 +3369,20 @@
         <p:spPr/>
         <p:txBody>
           <a:bodyPr/>
-          <a:lstStyle/>
-          <a:p>
-            <a:fld id="{17CBEA34-C929-4AD0-8188-382F7E640583}" type="slidenum">
-              <a:rPr lang="en-US" smtClean="0"/>
+          <a:lstStyle>
+            <a:lvl1pPr>
+              <a:defRPr/>
+            </a:lvl1pPr>
+          </a:lstStyle>
+          <a:p>
+            <a:pPr>
+              <a:defRPr/>
+            </a:pPr>
+            <a:fld id="{6A56DAD7-373B-4C35-8FEF-BD1EE7CDF3F9}" type="slidenum">
+              <a:rPr lang="en-US"/>
+              <a:pPr>
+                <a:defRPr/>
+              </a:pPr>
               <a:t>‹#›</a:t>
             </a:fld>
             <a:endParaRPr lang="en-US"/>
@@ -2966,11 +3390,6 @@
         </p:txBody>
       </p:sp>
     </p:spTree>
-    <p:extLst>
-      <p:ext uri="{BB962C8B-B14F-4D97-AF65-F5344CB8AC3E}">
-        <p14:creationId xmlns:p14="http://schemas.microsoft.com/office/powerpoint/2010/main" val="908173724"/>
-      </p:ext>
-    </p:extLst>
   </p:cSld>
   <p:clrMapOvr>
     <a:masterClrMapping/>
@@ -3002,7 +3421,7 @@
       </p:grpSpPr>
       <p:sp>
         <p:nvSpPr>
-          <p:cNvPr id="2" name="Title Placeholder 1"/>
+          <p:cNvPr id="1026" name="Title Placeholder 1"/>
           <p:cNvSpPr>
             <a:spLocks noGrp="1"/>
           </p:cNvSpPr>
@@ -3010,7 +3429,7 @@
             <p:ph type="title"/>
           </p:nvPr>
         </p:nvSpPr>
-        <p:spPr>
+        <p:spPr bwMode="auto">
           <a:xfrm>
             <a:off x="838200" y="365125"/>
             <a:ext cx="10515600" cy="1325563"/>
@@ -3018,24 +3437,33 @@
           <a:prstGeom prst="rect">
             <a:avLst/>
           </a:prstGeom>
+          <a:noFill/>
+          <a:ln w="9525">
+            <a:noFill/>
+            <a:miter lim="800000"/>
+            <a:headEnd/>
+            <a:tailEnd/>
+          </a:ln>
         </p:spPr>
         <p:txBody>
-          <a:bodyPr vert="horz" lIns="91440" tIns="45720" rIns="91440" bIns="45720" rtlCol="0" anchor="ctr">
-            <a:normAutofit/>
+          <a:bodyPr vert="horz" wrap="square" lIns="91440" tIns="45720" rIns="91440" bIns="45720" numCol="1" anchor="ctr" anchorCtr="0" compatLnSpc="1">
+            <a:prstTxWarp prst="textNoShape">
+              <a:avLst/>
+            </a:prstTxWarp>
           </a:bodyPr>
           <a:lstStyle/>
           <a:p>
+            <a:pPr lvl="0"/>
             <a:r>
               <a:rPr lang="en-US" smtClean="0"/>
               <a:t>Click to edit Master title style</a:t>
             </a:r>
-            <a:endParaRPr lang="en-US"/>
-          </a:p>
-        </p:txBody>
-      </p:sp>
-      <p:sp>
-        <p:nvSpPr>
-          <p:cNvPr id="3" name="Text Placeholder 2"/>
+          </a:p>
+        </p:txBody>
+      </p:sp>
+      <p:sp>
+        <p:nvSpPr>
+          <p:cNvPr id="1027" name="Text Placeholder 2"/>
           <p:cNvSpPr>
             <a:spLocks noGrp="1"/>
           </p:cNvSpPr>
@@ -3043,7 +3471,7 @@
             <p:ph type="body" idx="1"/>
           </p:nvPr>
         </p:nvSpPr>
-        <p:spPr>
+        <p:spPr bwMode="auto">
           <a:xfrm>
             <a:off x="838200" y="1825625"/>
             <a:ext cx="10515600" cy="4351338"/>
@@ -3051,10 +3479,19 @@
           <a:prstGeom prst="rect">
             <a:avLst/>
           </a:prstGeom>
+          <a:noFill/>
+          <a:ln w="9525">
+            <a:noFill/>
+            <a:miter lim="800000"/>
+            <a:headEnd/>
+            <a:tailEnd/>
+          </a:ln>
         </p:spPr>
         <p:txBody>
-          <a:bodyPr vert="horz" lIns="91440" tIns="45720" rIns="91440" bIns="45720" rtlCol="0">
-            <a:normAutofit/>
+          <a:bodyPr vert="horz" wrap="square" lIns="91440" tIns="45720" rIns="91440" bIns="45720" numCol="1" anchor="t" anchorCtr="0" compatLnSpc="1">
+            <a:prstTxWarp prst="textNoShape">
+              <a:avLst/>
+            </a:prstTxWarp>
           </a:bodyPr>
           <a:lstStyle/>
           <a:p>
@@ -3091,7 +3528,6 @@
               <a:rPr lang="en-US" smtClean="0"/>
               <a:t>Fifth level</a:t>
             </a:r>
-            <a:endParaRPr lang="en-US"/>
           </a:p>
         </p:txBody>
       </p:sp>
@@ -3117,20 +3553,34 @@
         <p:txBody>
           <a:bodyPr vert="horz" lIns="91440" tIns="45720" rIns="91440" bIns="45720" rtlCol="0" anchor="ctr"/>
           <a:lstStyle>
-            <a:lvl1pPr algn="l">
-              <a:defRPr sz="1200">
+            <a:lvl1pPr algn="l" fontAlgn="auto">
+              <a:spcBef>
+                <a:spcPts val="0"/>
+              </a:spcBef>
+              <a:spcAft>
+                <a:spcPts val="0"/>
+              </a:spcAft>
+              <a:defRPr sz="1200" smtClean="0">
                 <a:solidFill>
                   <a:schemeClr val="tx1">
                     <a:tint val="75000"/>
                   </a:schemeClr>
                 </a:solidFill>
+                <a:latin typeface="+mn-lt"/>
+                <a:cs typeface="+mn-cs"/>
               </a:defRPr>
             </a:lvl1pPr>
           </a:lstStyle>
           <a:p>
-            <a:fld id="{A5A9A3C9-D83C-49C7-8F3F-93C805BF6DAA}" type="datetimeFigureOut">
-              <a:rPr lang="en-US" smtClean="0"/>
-              <a:t>4/16/2016</a:t>
+            <a:pPr>
+              <a:defRPr/>
+            </a:pPr>
+            <a:fld id="{64F5E6FA-CAE1-4ACB-934C-7AEE052939BA}" type="datetimeFigureOut">
+              <a:rPr lang="en-US"/>
+              <a:pPr>
+                <a:defRPr/>
+              </a:pPr>
+              <a:t>4/18/2016</a:t>
             </a:fld>
             <a:endParaRPr lang="en-US"/>
           </a:p>
@@ -3158,17 +3608,28 @@
         <p:txBody>
           <a:bodyPr vert="horz" lIns="91440" tIns="45720" rIns="91440" bIns="45720" rtlCol="0" anchor="ctr"/>
           <a:lstStyle>
-            <a:lvl1pPr algn="ctr">
+            <a:lvl1pPr algn="ctr" fontAlgn="auto">
+              <a:spcBef>
+                <a:spcPts val="0"/>
+              </a:spcBef>
+              <a:spcAft>
+                <a:spcPts val="0"/>
+              </a:spcAft>
               <a:defRPr sz="1200">
                 <a:solidFill>
                   <a:schemeClr val="tx1">
                     <a:tint val="75000"/>
                   </a:schemeClr>
                 </a:solidFill>
+                <a:latin typeface="+mn-lt"/>
+                <a:cs typeface="+mn-cs"/>
               </a:defRPr>
             </a:lvl1pPr>
           </a:lstStyle>
           <a:p>
+            <a:pPr>
+              <a:defRPr/>
+            </a:pPr>
             <a:endParaRPr lang="en-US"/>
           </a:p>
         </p:txBody>
@@ -3195,19 +3656,33 @@
         <p:txBody>
           <a:bodyPr vert="horz" lIns="91440" tIns="45720" rIns="91440" bIns="45720" rtlCol="0" anchor="ctr"/>
           <a:lstStyle>
-            <a:lvl1pPr algn="r">
-              <a:defRPr sz="1200">
+            <a:lvl1pPr algn="r" fontAlgn="auto">
+              <a:spcBef>
+                <a:spcPts val="0"/>
+              </a:spcBef>
+              <a:spcAft>
+                <a:spcPts val="0"/>
+              </a:spcAft>
+              <a:defRPr sz="1200" smtClean="0">
                 <a:solidFill>
                   <a:schemeClr val="tx1">
                     <a:tint val="75000"/>
                   </a:schemeClr>
                 </a:solidFill>
+                <a:latin typeface="+mn-lt"/>
+                <a:cs typeface="+mn-cs"/>
               </a:defRPr>
             </a:lvl1pPr>
           </a:lstStyle>
           <a:p>
-            <a:fld id="{17CBEA34-C929-4AD0-8188-382F7E640583}" type="slidenum">
-              <a:rPr lang="en-US" smtClean="0"/>
+            <a:pPr>
+              <a:defRPr/>
+            </a:pPr>
+            <a:fld id="{520A29A7-2905-4ED3-8597-89791303B690}" type="slidenum">
+              <a:rPr lang="en-US"/>
+              <a:pPr>
+                <a:defRPr/>
+              </a:pPr>
               <a:t>‹#›</a:t>
             </a:fld>
             <a:endParaRPr lang="en-US"/>
@@ -3215,11 +3690,6 @@
         </p:txBody>
       </p:sp>
     </p:spTree>
-    <p:extLst>
-      <p:ext uri="{BB962C8B-B14F-4D97-AF65-F5344CB8AC3E}">
-        <p14:creationId xmlns:p14="http://schemas.microsoft.com/office/powerpoint/2010/main" val="1242094419"/>
-      </p:ext>
-    </p:extLst>
   </p:cSld>
   <p:clrMap bg1="lt1" tx1="dk1" bg2="lt2" tx2="dk2" accent1="accent1" accent2="accent2" accent3="accent3" accent4="accent4" accent5="accent5" accent6="accent6" hlink="hlink" folHlink="folHlink"/>
   <p:sldLayoutIdLst>
@@ -3237,14 +3707,16 @@
   </p:sldLayoutIdLst>
   <p:txStyles>
     <p:titleStyle>
-      <a:lvl1pPr algn="l" defTabSz="914400" rtl="0" eaLnBrk="1" latinLnBrk="0" hangingPunct="1">
+      <a:lvl1pPr algn="l" rtl="0" fontAlgn="base">
         <a:lnSpc>
           <a:spcPct val="90000"/>
         </a:lnSpc>
         <a:spcBef>
           <a:spcPct val="0"/>
         </a:spcBef>
-        <a:buNone/>
+        <a:spcAft>
+          <a:spcPct val="0"/>
+        </a:spcAft>
         <a:defRPr sz="4400" kern="1200">
           <a:solidFill>
             <a:schemeClr val="tx1"/>
@@ -3254,16 +3726,155 @@
           <a:cs typeface="+mj-cs"/>
         </a:defRPr>
       </a:lvl1pPr>
+      <a:lvl2pPr algn="l" rtl="0" fontAlgn="base">
+        <a:lnSpc>
+          <a:spcPct val="90000"/>
+        </a:lnSpc>
+        <a:spcBef>
+          <a:spcPct val="0"/>
+        </a:spcBef>
+        <a:spcAft>
+          <a:spcPct val="0"/>
+        </a:spcAft>
+        <a:defRPr sz="4400">
+          <a:solidFill>
+            <a:schemeClr val="tx1"/>
+          </a:solidFill>
+          <a:latin typeface="Calibri Light" pitchFamily="34" charset="0"/>
+        </a:defRPr>
+      </a:lvl2pPr>
+      <a:lvl3pPr algn="l" rtl="0" fontAlgn="base">
+        <a:lnSpc>
+          <a:spcPct val="90000"/>
+        </a:lnSpc>
+        <a:spcBef>
+          <a:spcPct val="0"/>
+        </a:spcBef>
+        <a:spcAft>
+          <a:spcPct val="0"/>
+        </a:spcAft>
+        <a:defRPr sz="4400">
+          <a:solidFill>
+            <a:schemeClr val="tx1"/>
+          </a:solidFill>
+          <a:latin typeface="Calibri Light" pitchFamily="34" charset="0"/>
+        </a:defRPr>
+      </a:lvl3pPr>
+      <a:lvl4pPr algn="l" rtl="0" fontAlgn="base">
+        <a:lnSpc>
+          <a:spcPct val="90000"/>
+        </a:lnSpc>
+        <a:spcBef>
+          <a:spcPct val="0"/>
+        </a:spcBef>
+        <a:spcAft>
+          <a:spcPct val="0"/>
+        </a:spcAft>
+        <a:defRPr sz="4400">
+          <a:solidFill>
+            <a:schemeClr val="tx1"/>
+          </a:solidFill>
+          <a:latin typeface="Calibri Light" pitchFamily="34" charset="0"/>
+        </a:defRPr>
+      </a:lvl4pPr>
+      <a:lvl5pPr algn="l" rtl="0" fontAlgn="base">
+        <a:lnSpc>
+          <a:spcPct val="90000"/>
+        </a:lnSpc>
+        <a:spcBef>
+          <a:spcPct val="0"/>
+        </a:spcBef>
+        <a:spcAft>
+          <a:spcPct val="0"/>
+        </a:spcAft>
+        <a:defRPr sz="4400">
+          <a:solidFill>
+            <a:schemeClr val="tx1"/>
+          </a:solidFill>
+          <a:latin typeface="Calibri Light" pitchFamily="34" charset="0"/>
+        </a:defRPr>
+      </a:lvl5pPr>
+      <a:lvl6pPr marL="457200" algn="l" rtl="0" fontAlgn="base">
+        <a:lnSpc>
+          <a:spcPct val="90000"/>
+        </a:lnSpc>
+        <a:spcBef>
+          <a:spcPct val="0"/>
+        </a:spcBef>
+        <a:spcAft>
+          <a:spcPct val="0"/>
+        </a:spcAft>
+        <a:defRPr sz="4400">
+          <a:solidFill>
+            <a:schemeClr val="tx1"/>
+          </a:solidFill>
+          <a:latin typeface="Calibri Light" pitchFamily="34" charset="0"/>
+        </a:defRPr>
+      </a:lvl6pPr>
+      <a:lvl7pPr marL="914400" algn="l" rtl="0" fontAlgn="base">
+        <a:lnSpc>
+          <a:spcPct val="90000"/>
+        </a:lnSpc>
+        <a:spcBef>
+          <a:spcPct val="0"/>
+        </a:spcBef>
+        <a:spcAft>
+          <a:spcPct val="0"/>
+        </a:spcAft>
+        <a:defRPr sz="4400">
+          <a:solidFill>
+            <a:schemeClr val="tx1"/>
+          </a:solidFill>
+          <a:latin typeface="Calibri Light" pitchFamily="34" charset="0"/>
+        </a:defRPr>
+      </a:lvl7pPr>
+      <a:lvl8pPr marL="1371600" algn="l" rtl="0" fontAlgn="base">
+        <a:lnSpc>
+          <a:spcPct val="90000"/>
+        </a:lnSpc>
+        <a:spcBef>
+          <a:spcPct val="0"/>
+        </a:spcBef>
+        <a:spcAft>
+          <a:spcPct val="0"/>
+        </a:spcAft>
+        <a:defRPr sz="4400">
+          <a:solidFill>
+            <a:schemeClr val="tx1"/>
+          </a:solidFill>
+          <a:latin typeface="Calibri Light" pitchFamily="34" charset="0"/>
+        </a:defRPr>
+      </a:lvl8pPr>
+      <a:lvl9pPr marL="1828800" algn="l" rtl="0" fontAlgn="base">
+        <a:lnSpc>
+          <a:spcPct val="90000"/>
+        </a:lnSpc>
+        <a:spcBef>
+          <a:spcPct val="0"/>
+        </a:spcBef>
+        <a:spcAft>
+          <a:spcPct val="0"/>
+        </a:spcAft>
+        <a:defRPr sz="4400">
+          <a:solidFill>
+            <a:schemeClr val="tx1"/>
+          </a:solidFill>
+          <a:latin typeface="Calibri Light" pitchFamily="34" charset="0"/>
+        </a:defRPr>
+      </a:lvl9pPr>
     </p:titleStyle>
     <p:bodyStyle>
-      <a:lvl1pPr marL="228600" indent="-228600" algn="l" defTabSz="914400" rtl="0" eaLnBrk="1" latinLnBrk="0" hangingPunct="1">
+      <a:lvl1pPr marL="228600" indent="-228600" algn="l" rtl="0" fontAlgn="base">
         <a:lnSpc>
           <a:spcPct val="90000"/>
         </a:lnSpc>
         <a:spcBef>
           <a:spcPts val="1000"/>
         </a:spcBef>
-        <a:buFont typeface="Arial" panose="020B0604020202020204" pitchFamily="34" charset="0"/>
+        <a:spcAft>
+          <a:spcPct val="0"/>
+        </a:spcAft>
+        <a:buFont typeface="Arial" charset="0"/>
         <a:buChar char="•"/>
         <a:defRPr sz="2800" kern="1200">
           <a:solidFill>
@@ -3274,14 +3885,17 @@
           <a:cs typeface="+mn-cs"/>
         </a:defRPr>
       </a:lvl1pPr>
-      <a:lvl2pPr marL="685800" indent="-228600" algn="l" defTabSz="914400" rtl="0" eaLnBrk="1" latinLnBrk="0" hangingPunct="1">
+      <a:lvl2pPr marL="685800" indent="-228600" algn="l" rtl="0" fontAlgn="base">
         <a:lnSpc>
           <a:spcPct val="90000"/>
         </a:lnSpc>
         <a:spcBef>
           <a:spcPts val="500"/>
         </a:spcBef>
-        <a:buFont typeface="Arial" panose="020B0604020202020204" pitchFamily="34" charset="0"/>
+        <a:spcAft>
+          <a:spcPct val="0"/>
+        </a:spcAft>
+        <a:buFont typeface="Arial" charset="0"/>
         <a:buChar char="•"/>
         <a:defRPr sz="2400" kern="1200">
           <a:solidFill>
@@ -3292,14 +3906,17 @@
           <a:cs typeface="+mn-cs"/>
         </a:defRPr>
       </a:lvl2pPr>
-      <a:lvl3pPr marL="1143000" indent="-228600" algn="l" defTabSz="914400" rtl="0" eaLnBrk="1" latinLnBrk="0" hangingPunct="1">
+      <a:lvl3pPr marL="1143000" indent="-228600" algn="l" rtl="0" fontAlgn="base">
         <a:lnSpc>
           <a:spcPct val="90000"/>
         </a:lnSpc>
         <a:spcBef>
           <a:spcPts val="500"/>
         </a:spcBef>
-        <a:buFont typeface="Arial" panose="020B0604020202020204" pitchFamily="34" charset="0"/>
+        <a:spcAft>
+          <a:spcPct val="0"/>
+        </a:spcAft>
+        <a:buFont typeface="Arial" charset="0"/>
         <a:buChar char="•"/>
         <a:defRPr sz="2000" kern="1200">
           <a:solidFill>
@@ -3310,16 +3927,19 @@
           <a:cs typeface="+mn-cs"/>
         </a:defRPr>
       </a:lvl3pPr>
-      <a:lvl4pPr marL="1600200" indent="-228600" algn="l" defTabSz="914400" rtl="0" eaLnBrk="1" latinLnBrk="0" hangingPunct="1">
+      <a:lvl4pPr marL="1600200" indent="-228600" algn="l" rtl="0" fontAlgn="base">
         <a:lnSpc>
           <a:spcPct val="90000"/>
         </a:lnSpc>
         <a:spcBef>
           <a:spcPts val="500"/>
         </a:spcBef>
-        <a:buFont typeface="Arial" panose="020B0604020202020204" pitchFamily="34" charset="0"/>
+        <a:spcAft>
+          <a:spcPct val="0"/>
+        </a:spcAft>
+        <a:buFont typeface="Arial" charset="0"/>
         <a:buChar char="•"/>
-        <a:defRPr sz="1800" kern="1200">
+        <a:defRPr kern="1200">
           <a:solidFill>
             <a:schemeClr val="tx1"/>
           </a:solidFill>
@@ -3328,16 +3948,19 @@
           <a:cs typeface="+mn-cs"/>
         </a:defRPr>
       </a:lvl4pPr>
-      <a:lvl5pPr marL="2057400" indent="-228600" algn="l" defTabSz="914400" rtl="0" eaLnBrk="1" latinLnBrk="0" hangingPunct="1">
+      <a:lvl5pPr marL="2057400" indent="-228600" algn="l" rtl="0" fontAlgn="base">
         <a:lnSpc>
           <a:spcPct val="90000"/>
         </a:lnSpc>
         <a:spcBef>
           <a:spcPts val="500"/>
         </a:spcBef>
-        <a:buFont typeface="Arial" panose="020B0604020202020204" pitchFamily="34" charset="0"/>
+        <a:spcAft>
+          <a:spcPct val="0"/>
+        </a:spcAft>
+        <a:buFont typeface="Arial" charset="0"/>
         <a:buChar char="•"/>
-        <a:defRPr sz="1800" kern="1200">
+        <a:defRPr kern="1200">
           <a:solidFill>
             <a:schemeClr val="tx1"/>
           </a:solidFill>
@@ -3537,7 +4160,7 @@
       </p:grpSpPr>
       <p:sp>
         <p:nvSpPr>
-          <p:cNvPr id="2" name="Title 1"/>
+          <p:cNvPr id="14337" name="Title 1"/>
           <p:cNvSpPr>
             <a:spLocks noGrp="1"/>
           </p:cNvSpPr>
@@ -3547,7 +4170,7 @@
         </p:nvSpPr>
         <p:spPr>
           <a:xfrm>
-            <a:off x="1524000" y="495346"/>
+            <a:off x="1524000" y="495300"/>
             <a:ext cx="9144000" cy="2387600"/>
           </a:xfrm>
         </p:spPr>
@@ -3556,10 +4179,9 @@
           <a:lstStyle/>
           <a:p>
             <a:r>
-              <a:rPr lang="en-US" dirty="0" smtClean="0"/>
+              <a:rPr lang="en-US" smtClean="0"/>
               <a:t>GTASS – Team 15</a:t>
             </a:r>
-            <a:endParaRPr lang="en-US" dirty="0"/>
           </a:p>
         </p:txBody>
       </p:sp>
@@ -3575,53 +4197,80 @@
         </p:nvSpPr>
         <p:spPr/>
         <p:txBody>
-          <a:bodyPr>
+          <a:bodyPr rtlCol="0">
             <a:normAutofit lnSpcReduction="10000"/>
           </a:bodyPr>
           <a:lstStyle/>
           <a:p>
+            <a:pPr fontAlgn="auto">
+              <a:spcAft>
+                <a:spcPts val="0"/>
+              </a:spcAft>
+              <a:buFont typeface="Arial" panose="020B0604020202020204" pitchFamily="34" charset="0"/>
+              <a:buNone/>
+              <a:defRPr/>
+            </a:pPr>
             <a:r>
               <a:rPr lang="en-US" dirty="0" smtClean="0"/>
               <a:t>Samuel Roman</a:t>
             </a:r>
           </a:p>
           <a:p>
+            <a:pPr fontAlgn="auto">
+              <a:spcAft>
+                <a:spcPts val="0"/>
+              </a:spcAft>
+              <a:buFont typeface="Arial" panose="020B0604020202020204" pitchFamily="34" charset="0"/>
+              <a:buNone/>
+              <a:defRPr/>
+            </a:pPr>
             <a:r>
               <a:rPr lang="en-US" dirty="0" smtClean="0"/>
-              <a:t>Raphael </a:t>
-            </a:r>
-            <a:r>
-              <a:rPr lang="en-US" dirty="0" smtClean="0"/>
-              <a:t>(Alex)</a:t>
-            </a:r>
-            <a:r>
-              <a:rPr lang="en-US" dirty="0" smtClean="0"/>
-              <a:t> Saint-Louis</a:t>
-            </a:r>
-          </a:p>
-          <a:p>
+              <a:t>Raphael (Alex) Saint-Louis</a:t>
+            </a:r>
+          </a:p>
+          <a:p>
+            <a:pPr fontAlgn="auto">
+              <a:spcAft>
+                <a:spcPts val="0"/>
+              </a:spcAft>
+              <a:buFont typeface="Arial" panose="020B0604020202020204" pitchFamily="34" charset="0"/>
+              <a:buNone/>
+              <a:defRPr/>
+            </a:pPr>
             <a:r>
               <a:rPr lang="en-US" dirty="0" smtClean="0"/>
               <a:t>Julian Rojas</a:t>
             </a:r>
           </a:p>
           <a:p>
+            <a:pPr fontAlgn="auto">
+              <a:spcAft>
+                <a:spcPts val="0"/>
+              </a:spcAft>
+              <a:buFont typeface="Arial" panose="020B0604020202020204" pitchFamily="34" charset="0"/>
+              <a:buNone/>
+              <a:defRPr/>
+            </a:pPr>
             <a:r>
               <a:rPr lang="en-US" dirty="0" smtClean="0"/>
               <a:t>Robin Schiro</a:t>
             </a:r>
           </a:p>
           <a:p>
+            <a:pPr fontAlgn="auto">
+              <a:spcAft>
+                <a:spcPts val="0"/>
+              </a:spcAft>
+              <a:buFont typeface="Arial" panose="020B0604020202020204" pitchFamily="34" charset="0"/>
+              <a:buNone/>
+              <a:defRPr/>
+            </a:pPr>
             <a:endParaRPr lang="en-US" dirty="0"/>
           </a:p>
         </p:txBody>
       </p:sp>
     </p:spTree>
-    <p:extLst>
-      <p:ext uri="{BB962C8B-B14F-4D97-AF65-F5344CB8AC3E}">
-        <p14:creationId xmlns:p14="http://schemas.microsoft.com/office/powerpoint/2010/main" val="2352810244"/>
-      </p:ext>
-    </p:extLst>
   </p:cSld>
   <p:clrMapOvr>
     <a:masterClrMapping/>
@@ -3648,7 +4297,7 @@
       </p:grpSpPr>
       <p:pic>
         <p:nvPicPr>
-          <p:cNvPr id="6" name="Picture 5"/>
+          <p:cNvPr id="15361" name="Picture 5"/>
           <p:cNvPicPr>
             <a:picLocks noChangeAspect="1"/>
           </p:cNvPicPr>
@@ -3656,26 +4305,29 @@
         </p:nvPicPr>
         <p:blipFill>
           <a:blip r:embed="rId3"/>
+          <a:srcRect/>
           <a:stretch>
             <a:fillRect/>
           </a:stretch>
         </p:blipFill>
-        <p:spPr>
+        <p:spPr bwMode="auto">
           <a:xfrm>
-            <a:off x="1030513" y="275771"/>
-            <a:ext cx="9583462" cy="6328370"/>
+            <a:off x="1030288" y="276225"/>
+            <a:ext cx="9583737" cy="6327775"/>
           </a:xfrm>
           <a:prstGeom prst="rect">
             <a:avLst/>
           </a:prstGeom>
+          <a:noFill/>
+          <a:ln w="9525">
+            <a:noFill/>
+            <a:miter lim="800000"/>
+            <a:headEnd/>
+            <a:tailEnd/>
+          </a:ln>
         </p:spPr>
       </p:pic>
     </p:spTree>
-    <p:extLst>
-      <p:ext uri="{BB962C8B-B14F-4D97-AF65-F5344CB8AC3E}">
-        <p14:creationId xmlns:p14="http://schemas.microsoft.com/office/powerpoint/2010/main" val="1168789336"/>
-      </p:ext>
-    </p:extLst>
   </p:cSld>
   <p:clrMapOvr>
     <a:masterClrMapping/>
@@ -3709,7 +4361,7 @@
       </p:grpSpPr>
       <p:sp>
         <p:nvSpPr>
-          <p:cNvPr id="2" name="Title 1"/>
+          <p:cNvPr id="17409" name="Title 1"/>
           <p:cNvSpPr>
             <a:spLocks noGrp="1"/>
           </p:cNvSpPr>
@@ -3719,7 +4371,7 @@
         </p:nvSpPr>
         <p:spPr>
           <a:xfrm>
-            <a:off x="838200" y="153369"/>
+            <a:off x="838200" y="0"/>
             <a:ext cx="10515600" cy="1325563"/>
           </a:xfrm>
         </p:spPr>
@@ -3728,16 +4380,15 @@
           <a:lstStyle/>
           <a:p>
             <a:r>
-              <a:rPr lang="en-US" dirty="0" smtClean="0"/>
+              <a:rPr lang="en-US" smtClean="0"/>
               <a:t>Robin’s Contribution</a:t>
             </a:r>
-            <a:endParaRPr lang="en-US" dirty="0"/>
-          </a:p>
-        </p:txBody>
-      </p:sp>
-      <p:sp>
-        <p:nvSpPr>
-          <p:cNvPr id="3" name="Content Placeholder 2"/>
+          </a:p>
+        </p:txBody>
+      </p:sp>
+      <p:sp>
+        <p:nvSpPr>
+          <p:cNvPr id="17410" name="Content Placeholder 2"/>
           <p:cNvSpPr>
             <a:spLocks noGrp="1"/>
           </p:cNvSpPr>
@@ -3747,74 +4398,56 @@
         </p:nvSpPr>
         <p:spPr>
           <a:xfrm>
-            <a:off x="838200" y="1427447"/>
-            <a:ext cx="10515600" cy="5175484"/>
+            <a:off x="838200" y="1427163"/>
+            <a:ext cx="10515600" cy="5175250"/>
           </a:xfrm>
         </p:spPr>
         <p:txBody>
-          <a:bodyPr>
-            <a:normAutofit/>
-          </a:bodyPr>
+          <a:bodyPr/>
           <a:lstStyle/>
           <a:p>
             <a:r>
-              <a:rPr lang="en-US" dirty="0" smtClean="0"/>
+              <a:rPr lang="en-US" smtClean="0"/>
               <a:t>Finalized design of the database</a:t>
             </a:r>
           </a:p>
           <a:p>
             <a:pPr lvl="1"/>
             <a:r>
-              <a:rPr lang="en-US" dirty="0" smtClean="0"/>
-              <a:t>Created ER diagram, wrote the </a:t>
-            </a:r>
-            <a:r>
-              <a:rPr lang="en-US" dirty="0" err="1" smtClean="0"/>
-              <a:t>CreateTables</a:t>
-            </a:r>
-            <a:r>
-              <a:rPr lang="en-US" dirty="0" smtClean="0"/>
-              <a:t> script</a:t>
-            </a:r>
-          </a:p>
-          <a:p>
-            <a:r>
-              <a:rPr lang="en-US" dirty="0" smtClean="0"/>
-              <a:t>Set up project on Google App Engine, created </a:t>
-            </a:r>
-            <a:r>
-              <a:rPr lang="en-US" dirty="0" err="1" smtClean="0"/>
-              <a:t>CloudSQL</a:t>
-            </a:r>
-            <a:r>
-              <a:rPr lang="en-US" dirty="0" smtClean="0"/>
-              <a:t> database</a:t>
-            </a:r>
-          </a:p>
-          <a:p>
-            <a:r>
-              <a:rPr lang="en-US" dirty="0" smtClean="0"/>
+              <a:rPr lang="en-US" smtClean="0"/>
+              <a:t>Created ER diagram, wrote the CreateTables script</a:t>
+            </a:r>
+          </a:p>
+          <a:p>
+            <a:r>
+              <a:rPr lang="en-US" smtClean="0"/>
+              <a:t>Set up project on Google App Engine, created CloudSQL database</a:t>
+            </a:r>
+          </a:p>
+          <a:p>
+            <a:r>
+              <a:rPr lang="en-US" smtClean="0"/>
               <a:t>Developed back-end PHP/SQL support and front end for following views:</a:t>
             </a:r>
           </a:p>
           <a:p>
-            <a:endParaRPr lang="en-US" dirty="0" smtClean="0"/>
-          </a:p>
-          <a:p>
-            <a:endParaRPr lang="en-US" dirty="0"/>
-          </a:p>
-          <a:p>
-            <a:endParaRPr lang="en-US" dirty="0" smtClean="0"/>
-          </a:p>
-          <a:p>
-            <a:r>
-              <a:rPr lang="en-US" dirty="0" smtClean="0"/>
+            <a:endParaRPr lang="en-US" smtClean="0"/>
+          </a:p>
+          <a:p>
+            <a:endParaRPr lang="en-US" smtClean="0"/>
+          </a:p>
+          <a:p>
+            <a:endParaRPr lang="en-US" smtClean="0"/>
+          </a:p>
+          <a:p>
+            <a:r>
+              <a:rPr lang="en-US" smtClean="0"/>
               <a:t>Wrote logic to handle authentication and redirection from email links</a:t>
             </a:r>
           </a:p>
           <a:p>
             <a:r>
-              <a:rPr lang="en-US" dirty="0" smtClean="0"/>
+              <a:rPr lang="en-US" smtClean="0"/>
               <a:t>Created message handling for missing deadlines</a:t>
             </a:r>
           </a:p>
@@ -3838,9 +4471,7 @@
           </a:prstGeom>
         </p:spPr>
         <p:txBody>
-          <a:bodyPr vert="horz" lIns="91440" tIns="45720" rIns="91440" bIns="45720" numCol="2" rtlCol="0">
-            <a:noAutofit/>
-          </a:bodyPr>
+          <a:bodyPr numCol="2"/>
           <a:lstStyle>
             <a:lvl1pPr marL="228600" indent="-228600" algn="l" defTabSz="914400" rtl="0" eaLnBrk="1" latinLnBrk="0" hangingPunct="1">
               <a:lnSpc>
@@ -4006,42 +4637,72 @@
             </a:lvl9pPr>
           </a:lstStyle>
           <a:p>
-            <a:pPr lvl="1"/>
+            <a:pPr lvl="1" fontAlgn="auto">
+              <a:spcAft>
+                <a:spcPts val="0"/>
+              </a:spcAft>
+              <a:defRPr/>
+            </a:pPr>
             <a:r>
               <a:rPr lang="en-US" sz="2600" dirty="0" smtClean="0"/>
               <a:t>Create Session (back end only)</a:t>
             </a:r>
           </a:p>
           <a:p>
-            <a:pPr lvl="1"/>
+            <a:pPr lvl="1" fontAlgn="auto">
+              <a:spcAft>
+                <a:spcPts val="0"/>
+              </a:spcAft>
+              <a:defRPr/>
+            </a:pPr>
             <a:r>
               <a:rPr lang="en-US" sz="2600" dirty="0" smtClean="0"/>
               <a:t>Current Session</a:t>
             </a:r>
           </a:p>
           <a:p>
-            <a:pPr lvl="1"/>
+            <a:pPr lvl="1" fontAlgn="auto">
+              <a:spcAft>
+                <a:spcPts val="0"/>
+              </a:spcAft>
+              <a:defRPr/>
+            </a:pPr>
             <a:r>
               <a:rPr lang="en-US" sz="2600" dirty="0" smtClean="0"/>
               <a:t>Score Table (with Julian)</a:t>
             </a:r>
           </a:p>
           <a:p>
-            <a:pPr lvl="1"/>
+            <a:pPr lvl="1" fontAlgn="auto">
+              <a:spcAft>
+                <a:spcPts val="0"/>
+              </a:spcAft>
+              <a:defRPr/>
+            </a:pPr>
             <a:r>
               <a:rPr lang="en-US" sz="2600" dirty="0" smtClean="0"/>
               <a:t>Account</a:t>
             </a:r>
           </a:p>
           <a:p>
-            <a:pPr lvl="1"/>
+            <a:pPr lvl="1" fontAlgn="auto">
+              <a:spcAft>
+                <a:spcPts val="0"/>
+              </a:spcAft>
+              <a:defRPr/>
+            </a:pPr>
             <a:r>
               <a:rPr lang="en-US" sz="2600" dirty="0" smtClean="0"/>
               <a:t>Nominee Information Form</a:t>
             </a:r>
           </a:p>
           <a:p>
-            <a:pPr lvl="1"/>
+            <a:pPr lvl="1" fontAlgn="auto">
+              <a:spcAft>
+                <a:spcPts val="0"/>
+              </a:spcAft>
+              <a:defRPr/>
+            </a:pPr>
             <a:r>
               <a:rPr lang="en-US" sz="2600" dirty="0" smtClean="0"/>
               <a:t>Nominee Approval (with Alex)</a:t>
@@ -4051,11 +4712,204 @@
         </p:txBody>
       </p:sp>
     </p:spTree>
-    <p:extLst>
-      <p:ext uri="{BB962C8B-B14F-4D97-AF65-F5344CB8AC3E}">
-        <p14:creationId xmlns:p14="http://schemas.microsoft.com/office/powerpoint/2010/main" val="2789463506"/>
-      </p:ext>
-    </p:extLst>
+  </p:cSld>
+  <p:clrMapOvr>
+    <a:masterClrMapping/>
+  </p:clrMapOvr>
+</p:sld>
+</file>
+
+<file path=ppt/slides/slide4.xml><?xml version="1.0" encoding="utf-8"?>
+<p:sld xmlns:a="http://schemas.openxmlformats.org/drawingml/2006/main" xmlns:r="http://schemas.openxmlformats.org/officeDocument/2006/relationships" xmlns:p="http://schemas.openxmlformats.org/presentationml/2006/main">
+  <p:cSld>
+    <p:spTree>
+      <p:nvGrpSpPr>
+        <p:cNvPr id="1" name=""/>
+        <p:cNvGrpSpPr/>
+        <p:nvPr/>
+      </p:nvGrpSpPr>
+      <p:grpSpPr>
+        <a:xfrm>
+          <a:off x="0" y="0"/>
+          <a:ext cx="0" cy="0"/>
+          <a:chOff x="0" y="0"/>
+          <a:chExt cx="0" cy="0"/>
+        </a:xfrm>
+      </p:grpSpPr>
+      <p:sp>
+        <p:nvSpPr>
+          <p:cNvPr id="18434" name="Rectangle 2"/>
+          <p:cNvSpPr>
+            <a:spLocks noGrp="1"/>
+          </p:cNvSpPr>
+          <p:nvPr>
+            <p:ph type="title"/>
+          </p:nvPr>
+        </p:nvSpPr>
+        <p:spPr/>
+        <p:txBody>
+          <a:bodyPr/>
+          <a:lstStyle/>
+          <a:p>
+            <a:r>
+              <a:rPr lang="en-US" smtClean="0"/>
+              <a:t>Julian’s Contribution</a:t>
+            </a:r>
+          </a:p>
+        </p:txBody>
+      </p:sp>
+      <p:sp>
+        <p:nvSpPr>
+          <p:cNvPr id="18435" name="Rectangle 3"/>
+          <p:cNvSpPr>
+            <a:spLocks noGrp="1"/>
+          </p:cNvSpPr>
+          <p:nvPr>
+            <p:ph type="body" idx="1"/>
+          </p:nvPr>
+        </p:nvSpPr>
+        <p:spPr>
+          <a:xfrm>
+            <a:off x="715963" y="1825625"/>
+            <a:ext cx="10637837" cy="4640263"/>
+          </a:xfrm>
+        </p:spPr>
+        <p:txBody>
+          <a:bodyPr/>
+          <a:lstStyle/>
+          <a:p>
+            <a:r>
+              <a:rPr lang="en-US" smtClean="0"/>
+              <a:t>On the Documentation</a:t>
+            </a:r>
+          </a:p>
+          <a:p>
+            <a:pPr lvl="1"/>
+            <a:r>
+              <a:rPr lang="en-US" smtClean="0"/>
+              <a:t>Created the Use Case Diagram</a:t>
+            </a:r>
+          </a:p>
+          <a:p>
+            <a:r>
+              <a:rPr lang="en-US" smtClean="0"/>
+              <a:t>On Front End Development</a:t>
+            </a:r>
+          </a:p>
+          <a:p>
+            <a:pPr lvl="1"/>
+            <a:r>
+              <a:rPr lang="en-US" smtClean="0"/>
+              <a:t> Used JavaScript to develop the dynamic input algorithm and the input validation.</a:t>
+            </a:r>
+          </a:p>
+          <a:p>
+            <a:pPr lvl="1"/>
+            <a:r>
+              <a:rPr lang="en-US" smtClean="0"/>
+              <a:t>Used CSS for the styling of the tables found in the allSessionsView and scoreTable</a:t>
+            </a:r>
+          </a:p>
+          <a:p>
+            <a:pPr lvl="1"/>
+            <a:r>
+              <a:rPr lang="en-US" smtClean="0"/>
+              <a:t>Used HTML and PHP for views such as:</a:t>
+            </a:r>
+          </a:p>
+          <a:p>
+            <a:pPr lvl="2"/>
+            <a:r>
+              <a:rPr lang="en-US" smtClean="0"/>
+              <a:t>ClickedNom, createSession, NomineeForm, and the ones mentioned above.</a:t>
+            </a:r>
+          </a:p>
+          <a:p>
+            <a:r>
+              <a:rPr lang="en-US" smtClean="0"/>
+              <a:t>Back End Development</a:t>
+            </a:r>
+          </a:p>
+          <a:p>
+            <a:pPr lvl="1"/>
+            <a:r>
+              <a:rPr lang="en-US" smtClean="0"/>
+              <a:t>Used PHP/SQL for obtaining the Nominee’s already stored Info.</a:t>
+            </a:r>
+          </a:p>
+          <a:p>
+            <a:endParaRPr lang="en-US" smtClean="0"/>
+          </a:p>
+          <a:p>
+            <a:pPr lvl="1"/>
+            <a:endParaRPr lang="en-US" smtClean="0"/>
+          </a:p>
+        </p:txBody>
+      </p:sp>
+    </p:spTree>
+  </p:cSld>
+  <p:clrMapOvr>
+    <a:masterClrMapping/>
+  </p:clrMapOvr>
+</p:sld>
+</file>
+
+<file path=ppt/slides/slide5.xml><?xml version="1.0" encoding="utf-8"?>
+<p:sld xmlns:a="http://schemas.openxmlformats.org/drawingml/2006/main" xmlns:r="http://schemas.openxmlformats.org/officeDocument/2006/relationships" xmlns:p="http://schemas.openxmlformats.org/presentationml/2006/main">
+  <p:cSld>
+    <p:spTree>
+      <p:nvGrpSpPr>
+        <p:cNvPr id="1" name=""/>
+        <p:cNvGrpSpPr/>
+        <p:nvPr/>
+      </p:nvGrpSpPr>
+      <p:grpSpPr>
+        <a:xfrm>
+          <a:off x="0" y="0"/>
+          <a:ext cx="0" cy="0"/>
+          <a:chOff x="0" y="0"/>
+          <a:chExt cx="0" cy="0"/>
+        </a:xfrm>
+      </p:grpSpPr>
+      <p:sp>
+        <p:nvSpPr>
+          <p:cNvPr id="19458" name="Rectangle 2"/>
+          <p:cNvSpPr>
+            <a:spLocks noGrp="1"/>
+          </p:cNvSpPr>
+          <p:nvPr>
+            <p:ph type="title"/>
+          </p:nvPr>
+        </p:nvSpPr>
+        <p:spPr/>
+        <p:txBody>
+          <a:bodyPr/>
+          <a:lstStyle/>
+          <a:p>
+            <a:endParaRPr lang="en-US" smtClean="0"/>
+          </a:p>
+        </p:txBody>
+      </p:sp>
+      <p:sp>
+        <p:nvSpPr>
+          <p:cNvPr id="19459" name="Rectangle 3"/>
+          <p:cNvSpPr>
+            <a:spLocks noGrp="1"/>
+          </p:cNvSpPr>
+          <p:nvPr>
+            <p:ph type="body" idx="1"/>
+          </p:nvPr>
+        </p:nvSpPr>
+        <p:spPr/>
+        <p:txBody>
+          <a:bodyPr/>
+          <a:lstStyle/>
+          <a:p>
+            <a:endParaRPr lang="en-US" smtClean="0"/>
+          </a:p>
+        </p:txBody>
+      </p:sp>
+    </p:spTree>
   </p:cSld>
   <p:clrMapOvr>
     <a:masterClrMapping/>
@@ -4106,7 +4960,7 @@
     </a:clrScheme>
     <a:fontScheme name="Office">
       <a:majorFont>
-        <a:latin typeface="Calibri Light" panose="020F0302020204030204"/>
+        <a:latin typeface="Calibri Light"/>
         <a:ea typeface=""/>
         <a:cs typeface=""/>
         <a:font script="Jpan" typeface="ＭＳ Ｐゴシック"/>
@@ -4141,7 +4995,7 @@
         <a:font script="Geor" typeface="Sylfaen"/>
       </a:majorFont>
       <a:minorFont>
-        <a:latin typeface="Calibri" panose="020F0502020204030204"/>
+        <a:latin typeface="Calibri"/>
         <a:ea typeface=""/>
         <a:cs typeface=""/>
         <a:font script="Jpan" typeface="ＭＳ Ｐゴシック"/>
@@ -4318,7 +5172,7 @@
   <a:extraClrSchemeLst/>
   <a:extLst>
     <a:ext uri="{05A4C25C-085E-4340-85A3-A5531E510DB2}">
-      <thm15:themeFamily xmlns:thm15="http://schemas.microsoft.com/office/thememl/2012/main" name="Office Theme" id="{62F939B6-93AF-4DB8-9C6B-D6C7DFDC589F}" vid="{4A3C46E8-61CC-4603-A589-7422A47A8E4A}"/>
+      <thm15:themeFamily xmlns="" xmlns:thm15="http://schemas.microsoft.com/office/thememl/2012/main" name="Office Theme" id="{62F939B6-93AF-4DB8-9C6B-D6C7DFDC589F}" vid="{4A3C46E8-61CC-4603-A589-7422A47A8E4A}"/>
     </a:ext>
   </a:extLst>
 </a:theme>
@@ -4367,7 +5221,7 @@
     </a:clrScheme>
     <a:fontScheme name="Office">
       <a:majorFont>
-        <a:latin typeface="Calibri Light" panose="020F0302020204030204"/>
+        <a:latin typeface="Calibri Light"/>
         <a:ea typeface=""/>
         <a:cs typeface=""/>
         <a:font script="Jpan" typeface="ＭＳ Ｐゴシック"/>
@@ -4402,7 +5256,7 @@
         <a:font script="Geor" typeface="Sylfaen"/>
       </a:majorFont>
       <a:minorFont>
-        <a:latin typeface="Calibri" panose="020F0502020204030204"/>
+        <a:latin typeface="Calibri"/>
         <a:ea typeface=""/>
         <a:cs typeface=""/>
         <a:font script="Jpan" typeface="ＭＳ Ｐゴシック"/>
@@ -4579,7 +5433,7 @@
   <a:extraClrSchemeLst/>
   <a:extLst>
     <a:ext uri="{05A4C25C-085E-4340-85A3-A5531E510DB2}">
-      <thm15:themeFamily xmlns:thm15="http://schemas.microsoft.com/office/thememl/2012/main" name="Office Theme" id="{62F939B6-93AF-4DB8-9C6B-D6C7DFDC589F}" vid="{4A3C46E8-61CC-4603-A589-7422A47A8E4A}"/>
+      <thm15:themeFamily xmlns="" xmlns:thm15="http://schemas.microsoft.com/office/thememl/2012/main" name="Office Theme" id="{62F939B6-93AF-4DB8-9C6B-D6C7DFDC589F}" vid="{4A3C46E8-61CC-4603-A589-7422A47A8E4A}"/>
     </a:ext>
   </a:extLst>
 </a:theme>

</xml_diff>